<commit_message>
(Session 02) Hotfix Formatting
Interesting differences between Powerpoint and Google Slides...
</commit_message>
<xml_diff>
--- a/rust-beginner/session 02/RUSTikales Rust for beginners 02.pptx
+++ b/rust-beginner/session 02/RUSTikales Rust for beginners 02.pptx
@@ -6831,7 +6831,7 @@
   <p:cSld>
     <p:spTree>
       <p:nvGrpSpPr>
-        <p:cNvPr id="695" name="Shape 695"/>
+        <p:cNvPr id="694" name="Shape 694"/>
         <p:cNvGrpSpPr/>
         <p:nvPr/>
       </p:nvGrpSpPr>
@@ -6845,7 +6845,7 @@
       </p:grpSpPr>
       <p:sp>
         <p:nvSpPr>
-          <p:cNvPr id="696" name="Google Shape;696;g29203f76d94_0_865:notes"/>
+          <p:cNvPr id="695" name="Google Shape;695;g29203f76d94_0_865:notes"/>
           <p:cNvSpPr/>
           <p:nvPr>
             <p:ph idx="2" type="sldImg"/>
@@ -6880,7 +6880,7 @@
       </p:sp>
       <p:sp>
         <p:nvSpPr>
-          <p:cNvPr id="697" name="Google Shape;697;g29203f76d94_0_865:notes"/>
+          <p:cNvPr id="696" name="Google Shape;696;g29203f76d94_0_865:notes"/>
           <p:cNvSpPr txBox="1"/>
           <p:nvPr>
             <p:ph idx="1" type="body"/>
@@ -6930,7 +6930,7 @@
   <p:cSld>
     <p:spTree>
       <p:nvGrpSpPr>
-        <p:cNvPr id="712" name="Shape 712"/>
+        <p:cNvPr id="711" name="Shape 711"/>
         <p:cNvGrpSpPr/>
         <p:nvPr/>
       </p:nvGrpSpPr>
@@ -6944,7 +6944,7 @@
       </p:grpSpPr>
       <p:sp>
         <p:nvSpPr>
-          <p:cNvPr id="713" name="Google Shape;713;g29203f76d94_0_915:notes"/>
+          <p:cNvPr id="712" name="Google Shape;712;g29203f76d94_0_915:notes"/>
           <p:cNvSpPr/>
           <p:nvPr>
             <p:ph idx="2" type="sldImg"/>
@@ -6979,7 +6979,7 @@
       </p:sp>
       <p:sp>
         <p:nvSpPr>
-          <p:cNvPr id="714" name="Google Shape;714;g29203f76d94_0_915:notes"/>
+          <p:cNvPr id="713" name="Google Shape;713;g29203f76d94_0_915:notes"/>
           <p:cNvSpPr txBox="1"/>
           <p:nvPr>
             <p:ph idx="1" type="body"/>
@@ -7029,7 +7029,7 @@
   <p:cSld>
     <p:spTree>
       <p:nvGrpSpPr>
-        <p:cNvPr id="719" name="Shape 719"/>
+        <p:cNvPr id="718" name="Shape 718"/>
         <p:cNvGrpSpPr/>
         <p:nvPr/>
       </p:nvGrpSpPr>
@@ -7043,7 +7043,7 @@
       </p:grpSpPr>
       <p:sp>
         <p:nvSpPr>
-          <p:cNvPr id="720" name="Google Shape;720;g29203f76d94_0_931:notes"/>
+          <p:cNvPr id="719" name="Google Shape;719;g29203f76d94_0_931:notes"/>
           <p:cNvSpPr/>
           <p:nvPr>
             <p:ph idx="2" type="sldImg"/>
@@ -7078,7 +7078,7 @@
       </p:sp>
       <p:sp>
         <p:nvSpPr>
-          <p:cNvPr id="721" name="Google Shape;721;g29203f76d94_0_931:notes"/>
+          <p:cNvPr id="720" name="Google Shape;720;g29203f76d94_0_931:notes"/>
           <p:cNvSpPr txBox="1"/>
           <p:nvPr>
             <p:ph idx="1" type="body"/>
@@ -7128,7 +7128,7 @@
   <p:cSld>
     <p:spTree>
       <p:nvGrpSpPr>
-        <p:cNvPr id="726" name="Shape 726"/>
+        <p:cNvPr id="725" name="Shape 725"/>
         <p:cNvGrpSpPr/>
         <p:nvPr/>
       </p:nvGrpSpPr>
@@ -7142,7 +7142,7 @@
       </p:grpSpPr>
       <p:sp>
         <p:nvSpPr>
-          <p:cNvPr id="727" name="Google Shape;727;g29203f76d94_0_937:notes"/>
+          <p:cNvPr id="726" name="Google Shape;726;g29203f76d94_0_937:notes"/>
           <p:cNvSpPr/>
           <p:nvPr>
             <p:ph idx="2" type="sldImg"/>
@@ -7177,7 +7177,7 @@
       </p:sp>
       <p:sp>
         <p:nvSpPr>
-          <p:cNvPr id="728" name="Google Shape;728;g29203f76d94_0_937:notes"/>
+          <p:cNvPr id="727" name="Google Shape;727;g29203f76d94_0_937:notes"/>
           <p:cNvSpPr txBox="1"/>
           <p:nvPr>
             <p:ph idx="1" type="body"/>
@@ -7227,7 +7227,7 @@
   <p:cSld>
     <p:spTree>
       <p:nvGrpSpPr>
-        <p:cNvPr id="733" name="Shape 733"/>
+        <p:cNvPr id="732" name="Shape 732"/>
         <p:cNvGrpSpPr/>
         <p:nvPr/>
       </p:nvGrpSpPr>
@@ -7241,7 +7241,7 @@
       </p:grpSpPr>
       <p:sp>
         <p:nvSpPr>
-          <p:cNvPr id="734" name="Google Shape;734;g29203f76d94_0_943:notes"/>
+          <p:cNvPr id="733" name="Google Shape;733;g29203f76d94_0_943:notes"/>
           <p:cNvSpPr/>
           <p:nvPr>
             <p:ph idx="2" type="sldImg"/>
@@ -7276,7 +7276,7 @@
       </p:sp>
       <p:sp>
         <p:nvSpPr>
-          <p:cNvPr id="735" name="Google Shape;735;g29203f76d94_0_943:notes"/>
+          <p:cNvPr id="734" name="Google Shape;734;g29203f76d94_0_943:notes"/>
           <p:cNvSpPr txBox="1"/>
           <p:nvPr>
             <p:ph idx="1" type="body"/>
@@ -7425,7 +7425,7 @@
   <p:cSld>
     <p:spTree>
       <p:nvGrpSpPr>
-        <p:cNvPr id="740" name="Shape 740"/>
+        <p:cNvPr id="739" name="Shape 739"/>
         <p:cNvGrpSpPr/>
         <p:nvPr/>
       </p:nvGrpSpPr>
@@ -7439,7 +7439,7 @@
       </p:grpSpPr>
       <p:sp>
         <p:nvSpPr>
-          <p:cNvPr id="741" name="Google Shape;741;g29203f76d94_0_949:notes"/>
+          <p:cNvPr id="740" name="Google Shape;740;g29203f76d94_0_949:notes"/>
           <p:cNvSpPr/>
           <p:nvPr>
             <p:ph idx="2" type="sldImg"/>
@@ -7474,7 +7474,7 @@
       </p:sp>
       <p:sp>
         <p:nvSpPr>
-          <p:cNvPr id="742" name="Google Shape;742;g29203f76d94_0_949:notes"/>
+          <p:cNvPr id="741" name="Google Shape;741;g29203f76d94_0_949:notes"/>
           <p:cNvSpPr txBox="1"/>
           <p:nvPr>
             <p:ph idx="1" type="body"/>
@@ -7524,7 +7524,7 @@
   <p:cSld>
     <p:spTree>
       <p:nvGrpSpPr>
-        <p:cNvPr id="750" name="Shape 750"/>
+        <p:cNvPr id="749" name="Shape 749"/>
         <p:cNvGrpSpPr/>
         <p:nvPr/>
       </p:nvGrpSpPr>
@@ -7538,7 +7538,7 @@
       </p:grpSpPr>
       <p:sp>
         <p:nvSpPr>
-          <p:cNvPr id="751" name="Google Shape;751;g29203f76d94_0_958:notes"/>
+          <p:cNvPr id="750" name="Google Shape;750;g29203f76d94_0_958:notes"/>
           <p:cNvSpPr/>
           <p:nvPr>
             <p:ph idx="2" type="sldImg"/>
@@ -7573,7 +7573,7 @@
       </p:sp>
       <p:sp>
         <p:nvSpPr>
-          <p:cNvPr id="752" name="Google Shape;752;g29203f76d94_0_958:notes"/>
+          <p:cNvPr id="751" name="Google Shape;751;g29203f76d94_0_958:notes"/>
           <p:cNvSpPr txBox="1"/>
           <p:nvPr>
             <p:ph idx="1" type="body"/>
@@ -7623,7 +7623,7 @@
   <p:cSld>
     <p:spTree>
       <p:nvGrpSpPr>
-        <p:cNvPr id="760" name="Shape 760"/>
+        <p:cNvPr id="759" name="Shape 759"/>
         <p:cNvGrpSpPr/>
         <p:nvPr/>
       </p:nvGrpSpPr>
@@ -7637,7 +7637,7 @@
       </p:grpSpPr>
       <p:sp>
         <p:nvSpPr>
-          <p:cNvPr id="761" name="Google Shape;761;g29203f76d94_0_969:notes"/>
+          <p:cNvPr id="760" name="Google Shape;760;g29203f76d94_0_969:notes"/>
           <p:cNvSpPr/>
           <p:nvPr>
             <p:ph idx="2" type="sldImg"/>
@@ -7672,7 +7672,7 @@
       </p:sp>
       <p:sp>
         <p:nvSpPr>
-          <p:cNvPr id="762" name="Google Shape;762;g29203f76d94_0_969:notes"/>
+          <p:cNvPr id="761" name="Google Shape;761;g29203f76d94_0_969:notes"/>
           <p:cNvSpPr txBox="1"/>
           <p:nvPr>
             <p:ph idx="1" type="body"/>
@@ -7722,7 +7722,7 @@
   <p:cSld>
     <p:spTree>
       <p:nvGrpSpPr>
-        <p:cNvPr id="771" name="Shape 771"/>
+        <p:cNvPr id="770" name="Shape 770"/>
         <p:cNvGrpSpPr/>
         <p:nvPr/>
       </p:nvGrpSpPr>
@@ -7736,7 +7736,7 @@
       </p:grpSpPr>
       <p:sp>
         <p:nvSpPr>
-          <p:cNvPr id="772" name="Google Shape;772;g29203f76d94_0_981:notes"/>
+          <p:cNvPr id="771" name="Google Shape;771;g29203f76d94_0_981:notes"/>
           <p:cNvSpPr/>
           <p:nvPr>
             <p:ph idx="2" type="sldImg"/>
@@ -7771,7 +7771,7 @@
       </p:sp>
       <p:sp>
         <p:nvSpPr>
-          <p:cNvPr id="773" name="Google Shape;773;g29203f76d94_0_981:notes"/>
+          <p:cNvPr id="772" name="Google Shape;772;g29203f76d94_0_981:notes"/>
           <p:cNvSpPr txBox="1"/>
           <p:nvPr>
             <p:ph idx="1" type="body"/>
@@ -7821,7 +7821,7 @@
   <p:cSld>
     <p:spTree>
       <p:nvGrpSpPr>
-        <p:cNvPr id="782" name="Shape 782"/>
+        <p:cNvPr id="781" name="Shape 781"/>
         <p:cNvGrpSpPr/>
         <p:nvPr/>
       </p:nvGrpSpPr>
@@ -7835,7 +7835,7 @@
       </p:grpSpPr>
       <p:sp>
         <p:nvSpPr>
-          <p:cNvPr id="783" name="Google Shape;783;g29203f76d94_0_992:notes"/>
+          <p:cNvPr id="782" name="Google Shape;782;g29203f76d94_0_992:notes"/>
           <p:cNvSpPr/>
           <p:nvPr>
             <p:ph idx="2" type="sldImg"/>
@@ -7870,7 +7870,7 @@
       </p:sp>
       <p:sp>
         <p:nvSpPr>
-          <p:cNvPr id="784" name="Google Shape;784;g29203f76d94_0_992:notes"/>
+          <p:cNvPr id="783" name="Google Shape;783;g29203f76d94_0_992:notes"/>
           <p:cNvSpPr txBox="1"/>
           <p:nvPr>
             <p:ph idx="1" type="body"/>
@@ -7920,7 +7920,7 @@
   <p:cSld>
     <p:spTree>
       <p:nvGrpSpPr>
-        <p:cNvPr id="793" name="Shape 793"/>
+        <p:cNvPr id="792" name="Shape 792"/>
         <p:cNvGrpSpPr/>
         <p:nvPr/>
       </p:nvGrpSpPr>
@@ -7934,7 +7934,7 @@
       </p:grpSpPr>
       <p:sp>
         <p:nvSpPr>
-          <p:cNvPr id="794" name="Google Shape;794;g29203f76d94_0_1002:notes"/>
+          <p:cNvPr id="793" name="Google Shape;793;g29203f76d94_0_1002:notes"/>
           <p:cNvSpPr/>
           <p:nvPr>
             <p:ph idx="2" type="sldImg"/>
@@ -7969,7 +7969,7 @@
       </p:sp>
       <p:sp>
         <p:nvSpPr>
-          <p:cNvPr id="795" name="Google Shape;795;g29203f76d94_0_1002:notes"/>
+          <p:cNvPr id="794" name="Google Shape;794;g29203f76d94_0_1002:notes"/>
           <p:cNvSpPr txBox="1"/>
           <p:nvPr>
             <p:ph idx="1" type="body"/>
@@ -8019,7 +8019,7 @@
   <p:cSld>
     <p:spTree>
       <p:nvGrpSpPr>
-        <p:cNvPr id="804" name="Shape 804"/>
+        <p:cNvPr id="803" name="Shape 803"/>
         <p:cNvGrpSpPr/>
         <p:nvPr/>
       </p:nvGrpSpPr>
@@ -8033,7 +8033,7 @@
       </p:grpSpPr>
       <p:sp>
         <p:nvSpPr>
-          <p:cNvPr id="805" name="Google Shape;805;g29203f76d94_0_1012:notes"/>
+          <p:cNvPr id="804" name="Google Shape;804;g29203f76d94_0_1012:notes"/>
           <p:cNvSpPr/>
           <p:nvPr>
             <p:ph idx="2" type="sldImg"/>
@@ -8068,7 +8068,7 @@
       </p:sp>
       <p:sp>
         <p:nvSpPr>
-          <p:cNvPr id="806" name="Google Shape;806;g29203f76d94_0_1012:notes"/>
+          <p:cNvPr id="805" name="Google Shape;805;g29203f76d94_0_1012:notes"/>
           <p:cNvSpPr txBox="1"/>
           <p:nvPr>
             <p:ph idx="1" type="body"/>
@@ -8118,7 +8118,7 @@
   <p:cSld>
     <p:spTree>
       <p:nvGrpSpPr>
-        <p:cNvPr id="815" name="Shape 815"/>
+        <p:cNvPr id="814" name="Shape 814"/>
         <p:cNvGrpSpPr/>
         <p:nvPr/>
       </p:nvGrpSpPr>
@@ -8132,7 +8132,7 @@
       </p:grpSpPr>
       <p:sp>
         <p:nvSpPr>
-          <p:cNvPr id="816" name="Google Shape;816;g29203f76d94_0_1032:notes"/>
+          <p:cNvPr id="815" name="Google Shape;815;g29203f76d94_0_1032:notes"/>
           <p:cNvSpPr/>
           <p:nvPr>
             <p:ph idx="2" type="sldImg"/>
@@ -8167,7 +8167,7 @@
       </p:sp>
       <p:sp>
         <p:nvSpPr>
-          <p:cNvPr id="817" name="Google Shape;817;g29203f76d94_0_1032:notes"/>
+          <p:cNvPr id="816" name="Google Shape;816;g29203f76d94_0_1032:notes"/>
           <p:cNvSpPr txBox="1"/>
           <p:nvPr>
             <p:ph idx="1" type="body"/>
@@ -8217,7 +8217,7 @@
   <p:cSld>
     <p:spTree>
       <p:nvGrpSpPr>
-        <p:cNvPr id="822" name="Shape 822"/>
+        <p:cNvPr id="821" name="Shape 821"/>
         <p:cNvGrpSpPr/>
         <p:nvPr/>
       </p:nvGrpSpPr>
@@ -8231,7 +8231,7 @@
       </p:grpSpPr>
       <p:sp>
         <p:nvSpPr>
-          <p:cNvPr id="823" name="Google Shape;823;g29203f76d94_0_1042:notes"/>
+          <p:cNvPr id="822" name="Google Shape;822;g29203f76d94_0_1042:notes"/>
           <p:cNvSpPr/>
           <p:nvPr>
             <p:ph idx="2" type="sldImg"/>
@@ -8266,7 +8266,7 @@
       </p:sp>
       <p:sp>
         <p:nvSpPr>
-          <p:cNvPr id="824" name="Google Shape;824;g29203f76d94_0_1042:notes"/>
+          <p:cNvPr id="823" name="Google Shape;823;g29203f76d94_0_1042:notes"/>
           <p:cNvSpPr txBox="1"/>
           <p:nvPr>
             <p:ph idx="1" type="body"/>
@@ -8316,7 +8316,7 @@
   <p:cSld>
     <p:spTree>
       <p:nvGrpSpPr>
-        <p:cNvPr id="829" name="Shape 829"/>
+        <p:cNvPr id="828" name="Shape 828"/>
         <p:cNvGrpSpPr/>
         <p:nvPr/>
       </p:nvGrpSpPr>
@@ -8330,7 +8330,7 @@
       </p:grpSpPr>
       <p:sp>
         <p:nvSpPr>
-          <p:cNvPr id="830" name="Google Shape;830;g29203f76d94_0_1048:notes"/>
+          <p:cNvPr id="829" name="Google Shape;829;g29203f76d94_0_1048:notes"/>
           <p:cNvSpPr/>
           <p:nvPr>
             <p:ph idx="2" type="sldImg"/>
@@ -8365,7 +8365,7 @@
       </p:sp>
       <p:sp>
         <p:nvSpPr>
-          <p:cNvPr id="831" name="Google Shape;831;g29203f76d94_0_1048:notes"/>
+          <p:cNvPr id="830" name="Google Shape;830;g29203f76d94_0_1048:notes"/>
           <p:cNvSpPr txBox="1"/>
           <p:nvPr>
             <p:ph idx="1" type="body"/>
@@ -8514,7 +8514,7 @@
   <p:cSld>
     <p:spTree>
       <p:nvGrpSpPr>
-        <p:cNvPr id="836" name="Shape 836"/>
+        <p:cNvPr id="835" name="Shape 835"/>
         <p:cNvGrpSpPr/>
         <p:nvPr/>
       </p:nvGrpSpPr>
@@ -8528,7 +8528,7 @@
       </p:grpSpPr>
       <p:sp>
         <p:nvSpPr>
-          <p:cNvPr id="837" name="Google Shape;837;g29203f76d94_0_1054:notes"/>
+          <p:cNvPr id="836" name="Google Shape;836;g29203f76d94_0_1054:notes"/>
           <p:cNvSpPr/>
           <p:nvPr>
             <p:ph idx="2" type="sldImg"/>
@@ -8563,7 +8563,7 @@
       </p:sp>
       <p:sp>
         <p:nvSpPr>
-          <p:cNvPr id="838" name="Google Shape;838;g29203f76d94_0_1054:notes"/>
+          <p:cNvPr id="837" name="Google Shape;837;g29203f76d94_0_1054:notes"/>
           <p:cNvSpPr txBox="1"/>
           <p:nvPr>
             <p:ph idx="1" type="body"/>
@@ -8613,7 +8613,7 @@
   <p:cSld>
     <p:spTree>
       <p:nvGrpSpPr>
-        <p:cNvPr id="845" name="Shape 845"/>
+        <p:cNvPr id="844" name="Shape 844"/>
         <p:cNvGrpSpPr/>
         <p:nvPr/>
       </p:nvGrpSpPr>
@@ -8627,7 +8627,7 @@
       </p:grpSpPr>
       <p:sp>
         <p:nvSpPr>
-          <p:cNvPr id="846" name="Google Shape;846;g29203f76d94_0_1061:notes"/>
+          <p:cNvPr id="845" name="Google Shape;845;g29203f76d94_0_1061:notes"/>
           <p:cNvSpPr/>
           <p:nvPr>
             <p:ph idx="2" type="sldImg"/>
@@ -8662,7 +8662,7 @@
       </p:sp>
       <p:sp>
         <p:nvSpPr>
-          <p:cNvPr id="847" name="Google Shape;847;g29203f76d94_0_1061:notes"/>
+          <p:cNvPr id="846" name="Google Shape;846;g29203f76d94_0_1061:notes"/>
           <p:cNvSpPr txBox="1"/>
           <p:nvPr>
             <p:ph idx="1" type="body"/>
@@ -8712,7 +8712,7 @@
   <p:cSld>
     <p:spTree>
       <p:nvGrpSpPr>
-        <p:cNvPr id="856" name="Shape 856"/>
+        <p:cNvPr id="855" name="Shape 855"/>
         <p:cNvGrpSpPr/>
         <p:nvPr/>
       </p:nvGrpSpPr>
@@ -8726,7 +8726,7 @@
       </p:grpSpPr>
       <p:sp>
         <p:nvSpPr>
-          <p:cNvPr id="857" name="Google Shape;857;g29203f76d94_0_1072:notes"/>
+          <p:cNvPr id="856" name="Google Shape;856;g29203f76d94_0_1072:notes"/>
           <p:cNvSpPr/>
           <p:nvPr>
             <p:ph idx="2" type="sldImg"/>
@@ -8761,7 +8761,7 @@
       </p:sp>
       <p:sp>
         <p:nvSpPr>
-          <p:cNvPr id="858" name="Google Shape;858;g29203f76d94_0_1072:notes"/>
+          <p:cNvPr id="857" name="Google Shape;857;g29203f76d94_0_1072:notes"/>
           <p:cNvSpPr txBox="1"/>
           <p:nvPr>
             <p:ph idx="1" type="body"/>
@@ -8811,7 +8811,7 @@
   <p:cSld>
     <p:spTree>
       <p:nvGrpSpPr>
-        <p:cNvPr id="863" name="Shape 863"/>
+        <p:cNvPr id="862" name="Shape 862"/>
         <p:cNvGrpSpPr/>
         <p:nvPr/>
       </p:nvGrpSpPr>
@@ -8825,7 +8825,7 @@
       </p:grpSpPr>
       <p:sp>
         <p:nvSpPr>
-          <p:cNvPr id="864" name="Google Shape;864;g29203f76d94_0_1082:notes"/>
+          <p:cNvPr id="863" name="Google Shape;863;g29203f76d94_0_1082:notes"/>
           <p:cNvSpPr/>
           <p:nvPr>
             <p:ph idx="2" type="sldImg"/>
@@ -8860,7 +8860,7 @@
       </p:sp>
       <p:sp>
         <p:nvSpPr>
-          <p:cNvPr id="865" name="Google Shape;865;g29203f76d94_0_1082:notes"/>
+          <p:cNvPr id="864" name="Google Shape;864;g29203f76d94_0_1082:notes"/>
           <p:cNvSpPr txBox="1"/>
           <p:nvPr>
             <p:ph idx="1" type="body"/>
@@ -8910,7 +8910,7 @@
   <p:cSld>
     <p:spTree>
       <p:nvGrpSpPr>
-        <p:cNvPr id="870" name="Shape 870"/>
+        <p:cNvPr id="869" name="Shape 869"/>
         <p:cNvGrpSpPr/>
         <p:nvPr/>
       </p:nvGrpSpPr>
@@ -8924,7 +8924,7 @@
       </p:grpSpPr>
       <p:sp>
         <p:nvSpPr>
-          <p:cNvPr id="871" name="Google Shape;871;g29203f76d94_0_1113:notes"/>
+          <p:cNvPr id="870" name="Google Shape;870;g29203f76d94_0_1113:notes"/>
           <p:cNvSpPr/>
           <p:nvPr>
             <p:ph idx="2" type="sldImg"/>
@@ -8959,7 +8959,7 @@
       </p:sp>
       <p:sp>
         <p:nvSpPr>
-          <p:cNvPr id="872" name="Google Shape;872;g29203f76d94_0_1113:notes"/>
+          <p:cNvPr id="871" name="Google Shape;871;g29203f76d94_0_1113:notes"/>
           <p:cNvSpPr txBox="1"/>
           <p:nvPr>
             <p:ph idx="1" type="body"/>
@@ -9009,7 +9009,7 @@
   <p:cSld>
     <p:spTree>
       <p:nvGrpSpPr>
-        <p:cNvPr id="877" name="Shape 877"/>
+        <p:cNvPr id="876" name="Shape 876"/>
         <p:cNvGrpSpPr/>
         <p:nvPr/>
       </p:nvGrpSpPr>
@@ -9023,7 +9023,7 @@
       </p:grpSpPr>
       <p:sp>
         <p:nvSpPr>
-          <p:cNvPr id="878" name="Google Shape;878;g29203f76d94_0_1119:notes"/>
+          <p:cNvPr id="877" name="Google Shape;877;g29203f76d94_0_1119:notes"/>
           <p:cNvSpPr/>
           <p:nvPr>
             <p:ph idx="2" type="sldImg"/>
@@ -9058,7 +9058,7 @@
       </p:sp>
       <p:sp>
         <p:nvSpPr>
-          <p:cNvPr id="879" name="Google Shape;879;g29203f76d94_0_1119:notes"/>
+          <p:cNvPr id="878" name="Google Shape;878;g29203f76d94_0_1119:notes"/>
           <p:cNvSpPr txBox="1"/>
           <p:nvPr>
             <p:ph idx="1" type="body"/>
@@ -9108,7 +9108,7 @@
   <p:cSld>
     <p:spTree>
       <p:nvGrpSpPr>
-        <p:cNvPr id="884" name="Shape 884"/>
+        <p:cNvPr id="883" name="Shape 883"/>
         <p:cNvGrpSpPr/>
         <p:nvPr/>
       </p:nvGrpSpPr>
@@ -9122,7 +9122,7 @@
       </p:grpSpPr>
       <p:sp>
         <p:nvSpPr>
-          <p:cNvPr id="885" name="Google Shape;885;g29203f76d94_0_1107:notes"/>
+          <p:cNvPr id="884" name="Google Shape;884;g29203f76d94_0_1107:notes"/>
           <p:cNvSpPr/>
           <p:nvPr>
             <p:ph idx="2" type="sldImg"/>
@@ -9157,7 +9157,7 @@
       </p:sp>
       <p:sp>
         <p:nvSpPr>
-          <p:cNvPr id="886" name="Google Shape;886;g29203f76d94_0_1107:notes"/>
+          <p:cNvPr id="885" name="Google Shape;885;g29203f76d94_0_1107:notes"/>
           <p:cNvSpPr txBox="1"/>
           <p:nvPr>
             <p:ph idx="1" type="body"/>
@@ -21373,7 +21373,7 @@
             <a:tbl>
               <a:tblPr>
                 <a:noFill/>
-                <a:tableStyleId>{DE905B07-5F73-4FA6-90A6-E0F51304BA3A}</a:tableStyleId>
+                <a:tableStyleId>{7F1ABFE4-0AE7-4085-ADF8-4833B55F81E4}</a:tableStyleId>
               </a:tblPr>
               <a:tblGrid>
                 <a:gridCol w="998250"/>
@@ -22793,7 +22793,7 @@
             <a:tbl>
               <a:tblPr>
                 <a:noFill/>
-                <a:tableStyleId>{DE905B07-5F73-4FA6-90A6-E0F51304BA3A}</a:tableStyleId>
+                <a:tableStyleId>{7F1ABFE4-0AE7-4085-ADF8-4833B55F81E4}</a:tableStyleId>
               </a:tblPr>
               <a:tblGrid>
                 <a:gridCol w="998250"/>
@@ -24314,7 +24314,7 @@
             <a:tbl>
               <a:tblPr>
                 <a:noFill/>
-                <a:tableStyleId>{DE905B07-5F73-4FA6-90A6-E0F51304BA3A}</a:tableStyleId>
+                <a:tableStyleId>{7F1ABFE4-0AE7-4085-ADF8-4833B55F81E4}</a:tableStyleId>
               </a:tblPr>
               <a:tblGrid>
                 <a:gridCol w="998250"/>
@@ -26547,7 +26547,7 @@
         </p:nvSpPr>
         <p:spPr>
           <a:xfrm>
-            <a:off x="3841050" y="2509800"/>
+            <a:off x="3917250" y="2509800"/>
             <a:ext cx="550800" cy="192600"/>
           </a:xfrm>
           <a:prstGeom prst="rect">
@@ -26676,7 +26676,7 @@
         <p:spPr>
           <a:xfrm>
             <a:off x="1297500" y="1150500"/>
-            <a:ext cx="7038900" cy="2911200"/>
+            <a:ext cx="7473300" cy="2911200"/>
           </a:xfrm>
           <a:prstGeom prst="rect">
             <a:avLst/>
@@ -26911,7 +26911,7 @@
         </p:nvSpPr>
         <p:spPr>
           <a:xfrm>
-            <a:off x="3841050" y="2509800"/>
+            <a:off x="3917250" y="2509800"/>
             <a:ext cx="550800" cy="192600"/>
           </a:xfrm>
           <a:prstGeom prst="rect">
@@ -27445,7 +27445,7 @@
         </p:nvSpPr>
         <p:spPr>
           <a:xfrm>
-            <a:off x="3841050" y="2509800"/>
+            <a:off x="3917250" y="2509800"/>
             <a:ext cx="550800" cy="192600"/>
           </a:xfrm>
           <a:prstGeom prst="rect">
@@ -27843,7 +27843,7 @@
         </p:nvSpPr>
         <p:spPr>
           <a:xfrm>
-            <a:off x="3841050" y="2509800"/>
+            <a:off x="3917250" y="2509800"/>
             <a:ext cx="550800" cy="192600"/>
           </a:xfrm>
           <a:prstGeom prst="rect">
@@ -32099,7 +32099,7 @@
         </p:nvSpPr>
         <p:spPr>
           <a:xfrm>
-            <a:off x="7995425" y="2509800"/>
+            <a:off x="8071625" y="2509800"/>
             <a:ext cx="550800" cy="192600"/>
           </a:xfrm>
           <a:prstGeom prst="rect">
@@ -32227,7 +32227,7 @@
         <p:spPr>
           <a:xfrm>
             <a:off x="1297500" y="1567550"/>
-            <a:ext cx="7038900" cy="3168600"/>
+            <a:ext cx="7216500" cy="3168600"/>
           </a:xfrm>
           <a:prstGeom prst="rect">
             <a:avLst/>
@@ -32394,7 +32394,7 @@
         </p:nvSpPr>
         <p:spPr>
           <a:xfrm>
-            <a:off x="7995425" y="2509800"/>
+            <a:off x="8071625" y="2509800"/>
             <a:ext cx="550800" cy="192600"/>
           </a:xfrm>
           <a:prstGeom prst="rect">
@@ -32706,7 +32706,7 @@
         </p:nvSpPr>
         <p:spPr>
           <a:xfrm>
-            <a:off x="7995425" y="2509800"/>
+            <a:off x="8071625" y="2509800"/>
             <a:ext cx="550800" cy="192600"/>
           </a:xfrm>
           <a:prstGeom prst="rect">
@@ -33035,7 +33035,7 @@
         </p:nvSpPr>
         <p:spPr>
           <a:xfrm>
-            <a:off x="7995425" y="2509800"/>
+            <a:off x="8071625" y="2509800"/>
             <a:ext cx="550800" cy="192600"/>
           </a:xfrm>
           <a:prstGeom prst="rect">
@@ -33381,7 +33381,7 @@
         </p:nvSpPr>
         <p:spPr>
           <a:xfrm>
-            <a:off x="7995425" y="2509800"/>
+            <a:off x="8071625" y="2509800"/>
             <a:ext cx="550800" cy="192600"/>
           </a:xfrm>
           <a:prstGeom prst="rect">
@@ -33748,7 +33748,7 @@
         </p:nvSpPr>
         <p:spPr>
           <a:xfrm>
-            <a:off x="7995425" y="2509800"/>
+            <a:off x="8071625" y="2509800"/>
             <a:ext cx="550800" cy="192600"/>
           </a:xfrm>
           <a:prstGeom prst="rect">
@@ -34145,7 +34145,7 @@
         </p:nvSpPr>
         <p:spPr>
           <a:xfrm>
-            <a:off x="7995425" y="2509800"/>
+            <a:off x="8071625" y="2509800"/>
             <a:ext cx="550800" cy="192600"/>
           </a:xfrm>
           <a:prstGeom prst="rect">
@@ -34777,7 +34777,7 @@
         </p:nvSpPr>
         <p:spPr>
           <a:xfrm>
-            <a:off x="7995425" y="2509800"/>
+            <a:off x="8071625" y="2509800"/>
             <a:ext cx="550800" cy="192600"/>
           </a:xfrm>
           <a:prstGeom prst="rect">
@@ -39517,84 +39517,6 @@
       <p:sp>
         <p:nvSpPr>
           <p:cNvPr id="693" name="Google Shape;693;p76"/>
-          <p:cNvSpPr txBox="1"/>
-          <p:nvPr/>
-        </p:nvSpPr>
-        <p:spPr>
-          <a:xfrm>
-            <a:off x="0" y="0"/>
-            <a:ext cx="3000000" cy="658800"/>
-          </a:xfrm>
-          <a:prstGeom prst="rect">
-            <a:avLst/>
-          </a:prstGeom>
-          <a:noFill/>
-          <a:ln>
-            <a:noFill/>
-          </a:ln>
-        </p:spPr>
-        <p:txBody>
-          <a:bodyPr anchorCtr="0" anchor="t" bIns="91425" lIns="91425" spcFirstLastPara="1" rIns="91425" wrap="square" tIns="91425">
-            <a:spAutoFit/>
-          </a:bodyPr>
-          <a:lstStyle/>
-          <a:p>
-            <a:pPr indent="0" lvl="0" marL="0" rtl="0" algn="ctr">
-              <a:lnSpc>
-                <a:spcPct val="120000"/>
-              </a:lnSpc>
-              <a:spcBef>
-                <a:spcPts val="0"/>
-              </a:spcBef>
-              <a:spcAft>
-                <a:spcPts val="0"/>
-              </a:spcAft>
-              <a:buNone/>
-            </a:pPr>
-            <a:r>
-              <a:rPr lang="de">
-                <a:latin typeface="Lato"/>
-                <a:ea typeface="Lato"/>
-                <a:cs typeface="Lato"/>
-                <a:sym typeface="Lato"/>
-              </a:rPr>
-              <a:t>2/3</a:t>
-            </a:r>
-            <a:endParaRPr>
-              <a:latin typeface="Lato"/>
-              <a:ea typeface="Lato"/>
-              <a:cs typeface="Lato"/>
-              <a:sym typeface="Lato"/>
-            </a:endParaRPr>
-          </a:p>
-          <a:p>
-            <a:pPr indent="0" lvl="0" marL="0" rtl="0" algn="l">
-              <a:lnSpc>
-                <a:spcPct val="115000"/>
-              </a:lnSpc>
-              <a:spcBef>
-                <a:spcPts val="0"/>
-              </a:spcBef>
-              <a:spcAft>
-                <a:spcPts val="0"/>
-              </a:spcAft>
-              <a:buNone/>
-            </a:pPr>
-            <a:r>
-              <a:t/>
-            </a:r>
-            <a:endParaRPr>
-              <a:latin typeface="Lato"/>
-              <a:ea typeface="Lato"/>
-              <a:cs typeface="Lato"/>
-              <a:sym typeface="Lato"/>
-            </a:endParaRPr>
-          </a:p>
-        </p:txBody>
-      </p:sp>
-      <p:sp>
-        <p:nvSpPr>
-          <p:cNvPr id="694" name="Google Shape;694;p76"/>
           <p:cNvSpPr/>
           <p:nvPr/>
         </p:nvSpPr>
@@ -39665,7 +39587,7 @@
   <p:cSld>
     <p:spTree>
       <p:nvGrpSpPr>
-        <p:cNvPr id="698" name="Shape 698"/>
+        <p:cNvPr id="697" name="Shape 697"/>
         <p:cNvGrpSpPr/>
         <p:nvPr/>
       </p:nvGrpSpPr>
@@ -39679,7 +39601,7 @@
       </p:grpSpPr>
       <p:sp>
         <p:nvSpPr>
-          <p:cNvPr id="699" name="Google Shape;699;p77"/>
+          <p:cNvPr id="698" name="Google Shape;698;p77"/>
           <p:cNvSpPr txBox="1"/>
           <p:nvPr>
             <p:ph idx="4294967295" type="subTitle"/>
@@ -39723,7 +39645,7 @@
       </p:sp>
       <p:sp>
         <p:nvSpPr>
-          <p:cNvPr id="700" name="Google Shape;700;p77"/>
+          <p:cNvPr id="699" name="Google Shape;699;p77"/>
           <p:cNvSpPr txBox="1"/>
           <p:nvPr>
             <p:ph idx="1" type="body"/>
@@ -39764,7 +39686,7 @@
       </p:sp>
       <p:pic>
         <p:nvPicPr>
-          <p:cNvPr id="701" name="Google Shape;701;p77"/>
+          <p:cNvPr id="700" name="Google Shape;700;p77"/>
           <p:cNvPicPr preferRelativeResize="0"/>
           <p:nvPr/>
         </p:nvPicPr>
@@ -39792,7 +39714,7 @@
       </p:pic>
       <p:sp>
         <p:nvSpPr>
-          <p:cNvPr id="702" name="Google Shape;702;p77"/>
+          <p:cNvPr id="701" name="Google Shape;701;p77"/>
           <p:cNvSpPr/>
           <p:nvPr/>
         </p:nvSpPr>
@@ -39835,7 +39757,7 @@
       </p:sp>
       <p:sp>
         <p:nvSpPr>
-          <p:cNvPr id="703" name="Google Shape;703;p77"/>
+          <p:cNvPr id="702" name="Google Shape;702;p77"/>
           <p:cNvSpPr txBox="1"/>
           <p:nvPr/>
         </p:nvSpPr>
@@ -39893,7 +39815,7 @@
       </p:sp>
       <p:sp>
         <p:nvSpPr>
-          <p:cNvPr id="704" name="Google Shape;704;p77"/>
+          <p:cNvPr id="703" name="Google Shape;703;p77"/>
           <p:cNvSpPr/>
           <p:nvPr/>
         </p:nvSpPr>
@@ -39941,7 +39863,7 @@
       </p:sp>
       <p:sp>
         <p:nvSpPr>
-          <p:cNvPr id="705" name="Google Shape;705;p77"/>
+          <p:cNvPr id="704" name="Google Shape;704;p77"/>
           <p:cNvSpPr txBox="1"/>
           <p:nvPr/>
         </p:nvSpPr>
@@ -40022,7 +39944,7 @@
       </p:sp>
       <p:sp>
         <p:nvSpPr>
-          <p:cNvPr id="706" name="Google Shape;706;p77"/>
+          <p:cNvPr id="705" name="Google Shape;705;p77"/>
           <p:cNvSpPr/>
           <p:nvPr/>
         </p:nvSpPr>
@@ -40070,7 +39992,7 @@
       </p:sp>
       <p:sp>
         <p:nvSpPr>
-          <p:cNvPr id="707" name="Google Shape;707;p77"/>
+          <p:cNvPr id="706" name="Google Shape;706;p77"/>
           <p:cNvSpPr txBox="1"/>
           <p:nvPr/>
         </p:nvSpPr>
@@ -40128,7 +40050,7 @@
       </p:sp>
       <p:sp>
         <p:nvSpPr>
-          <p:cNvPr id="708" name="Google Shape;708;p77"/>
+          <p:cNvPr id="707" name="Google Shape;707;p77"/>
           <p:cNvSpPr txBox="1"/>
           <p:nvPr>
             <p:ph type="title"/>
@@ -40168,7 +40090,7 @@
       </p:sp>
       <p:sp>
         <p:nvSpPr>
-          <p:cNvPr id="709" name="Google Shape;709;p77"/>
+          <p:cNvPr id="708" name="Google Shape;708;p77"/>
           <p:cNvSpPr/>
           <p:nvPr/>
         </p:nvSpPr>
@@ -40211,7 +40133,7 @@
       </p:sp>
       <p:sp>
         <p:nvSpPr>
-          <p:cNvPr id="710" name="Google Shape;710;p77"/>
+          <p:cNvPr id="709" name="Google Shape;709;p77"/>
           <p:cNvSpPr txBox="1"/>
           <p:nvPr/>
         </p:nvSpPr>
@@ -40269,7 +40191,7 @@
       </p:sp>
       <p:sp>
         <p:nvSpPr>
-          <p:cNvPr id="711" name="Google Shape;711;p77"/>
+          <p:cNvPr id="710" name="Google Shape;710;p77"/>
           <p:cNvSpPr/>
           <p:nvPr/>
         </p:nvSpPr>
@@ -40340,7 +40262,7 @@
   <p:cSld>
     <p:spTree>
       <p:nvGrpSpPr>
-        <p:cNvPr id="715" name="Shape 715"/>
+        <p:cNvPr id="714" name="Shape 714"/>
         <p:cNvGrpSpPr/>
         <p:nvPr/>
       </p:nvGrpSpPr>
@@ -40354,7 +40276,7 @@
       </p:grpSpPr>
       <p:sp>
         <p:nvSpPr>
-          <p:cNvPr id="716" name="Google Shape;716;p78"/>
+          <p:cNvPr id="715" name="Google Shape;715;p78"/>
           <p:cNvSpPr txBox="1"/>
           <p:nvPr>
             <p:ph idx="4294967295" type="subTitle"/>
@@ -40398,7 +40320,7 @@
       </p:sp>
       <p:sp>
         <p:nvSpPr>
-          <p:cNvPr id="717" name="Google Shape;717;p78"/>
+          <p:cNvPr id="716" name="Google Shape;716;p78"/>
           <p:cNvSpPr txBox="1"/>
           <p:nvPr>
             <p:ph idx="1" type="body"/>
@@ -40437,7 +40359,7 @@
       </p:sp>
       <p:sp>
         <p:nvSpPr>
-          <p:cNvPr id="718" name="Google Shape;718;p78"/>
+          <p:cNvPr id="717" name="Google Shape;717;p78"/>
           <p:cNvSpPr txBox="1"/>
           <p:nvPr>
             <p:ph type="title"/>
@@ -40488,7 +40410,7 @@
   <p:cSld>
     <p:spTree>
       <p:nvGrpSpPr>
-        <p:cNvPr id="722" name="Shape 722"/>
+        <p:cNvPr id="721" name="Shape 721"/>
         <p:cNvGrpSpPr/>
         <p:nvPr/>
       </p:nvGrpSpPr>
@@ -40502,7 +40424,7 @@
       </p:grpSpPr>
       <p:sp>
         <p:nvSpPr>
-          <p:cNvPr id="723" name="Google Shape;723;p79"/>
+          <p:cNvPr id="722" name="Google Shape;722;p79"/>
           <p:cNvSpPr txBox="1"/>
           <p:nvPr>
             <p:ph idx="4294967295" type="subTitle"/>
@@ -40546,7 +40468,7 @@
       </p:sp>
       <p:sp>
         <p:nvSpPr>
-          <p:cNvPr id="724" name="Google Shape;724;p79"/>
+          <p:cNvPr id="723" name="Google Shape;723;p79"/>
           <p:cNvSpPr txBox="1"/>
           <p:nvPr>
             <p:ph idx="1" type="body"/>
@@ -40587,7 +40509,7 @@
       </p:sp>
       <p:sp>
         <p:nvSpPr>
-          <p:cNvPr id="725" name="Google Shape;725;p79"/>
+          <p:cNvPr id="724" name="Google Shape;724;p79"/>
           <p:cNvSpPr txBox="1"/>
           <p:nvPr>
             <p:ph type="title"/>
@@ -40638,7 +40560,7 @@
   <p:cSld>
     <p:spTree>
       <p:nvGrpSpPr>
-        <p:cNvPr id="729" name="Shape 729"/>
+        <p:cNvPr id="728" name="Shape 728"/>
         <p:cNvGrpSpPr/>
         <p:nvPr/>
       </p:nvGrpSpPr>
@@ -40652,7 +40574,7 @@
       </p:grpSpPr>
       <p:sp>
         <p:nvSpPr>
-          <p:cNvPr id="730" name="Google Shape;730;p80"/>
+          <p:cNvPr id="729" name="Google Shape;729;p80"/>
           <p:cNvSpPr txBox="1"/>
           <p:nvPr>
             <p:ph idx="4294967295" type="subTitle"/>
@@ -40696,7 +40618,7 @@
       </p:sp>
       <p:sp>
         <p:nvSpPr>
-          <p:cNvPr id="731" name="Google Shape;731;p80"/>
+          <p:cNvPr id="730" name="Google Shape;730;p80"/>
           <p:cNvSpPr txBox="1"/>
           <p:nvPr>
             <p:ph idx="1" type="body"/>
@@ -40754,7 +40676,7 @@
       </p:sp>
       <p:sp>
         <p:nvSpPr>
-          <p:cNvPr id="732" name="Google Shape;732;p80"/>
+          <p:cNvPr id="731" name="Google Shape;731;p80"/>
           <p:cNvSpPr txBox="1"/>
           <p:nvPr>
             <p:ph type="title"/>
@@ -40805,7 +40727,7 @@
   <p:cSld>
     <p:spTree>
       <p:nvGrpSpPr>
-        <p:cNvPr id="736" name="Shape 736"/>
+        <p:cNvPr id="735" name="Shape 735"/>
         <p:cNvGrpSpPr/>
         <p:nvPr/>
       </p:nvGrpSpPr>
@@ -40819,7 +40741,7 @@
       </p:grpSpPr>
       <p:sp>
         <p:nvSpPr>
-          <p:cNvPr id="737" name="Google Shape;737;p81"/>
+          <p:cNvPr id="736" name="Google Shape;736;p81"/>
           <p:cNvSpPr txBox="1"/>
           <p:nvPr>
             <p:ph idx="4294967295" type="subTitle"/>
@@ -40863,7 +40785,7 @@
       </p:sp>
       <p:sp>
         <p:nvSpPr>
-          <p:cNvPr id="738" name="Google Shape;738;p81"/>
+          <p:cNvPr id="737" name="Google Shape;737;p81"/>
           <p:cNvSpPr txBox="1"/>
           <p:nvPr>
             <p:ph idx="1" type="body"/>
@@ -40938,7 +40860,7 @@
       </p:sp>
       <p:sp>
         <p:nvSpPr>
-          <p:cNvPr id="739" name="Google Shape;739;p81"/>
+          <p:cNvPr id="738" name="Google Shape;738;p81"/>
           <p:cNvSpPr txBox="1"/>
           <p:nvPr>
             <p:ph type="title"/>
@@ -41222,7 +41144,7 @@
   <p:cSld>
     <p:spTree>
       <p:nvGrpSpPr>
-        <p:cNvPr id="743" name="Shape 743"/>
+        <p:cNvPr id="742" name="Shape 742"/>
         <p:cNvGrpSpPr/>
         <p:nvPr/>
       </p:nvGrpSpPr>
@@ -41236,7 +41158,7 @@
       </p:grpSpPr>
       <p:sp>
         <p:nvSpPr>
-          <p:cNvPr id="744" name="Google Shape;744;p82"/>
+          <p:cNvPr id="743" name="Google Shape;743;p82"/>
           <p:cNvSpPr txBox="1"/>
           <p:nvPr>
             <p:ph idx="4294967295" type="subTitle"/>
@@ -41280,7 +41202,7 @@
       </p:sp>
       <p:sp>
         <p:nvSpPr>
-          <p:cNvPr id="745" name="Google Shape;745;p82"/>
+          <p:cNvPr id="744" name="Google Shape;744;p82"/>
           <p:cNvSpPr txBox="1"/>
           <p:nvPr>
             <p:ph idx="1" type="body"/>
@@ -41355,7 +41277,7 @@
       </p:sp>
       <p:sp>
         <p:nvSpPr>
-          <p:cNvPr id="746" name="Google Shape;746;p82"/>
+          <p:cNvPr id="745" name="Google Shape;745;p82"/>
           <p:cNvSpPr txBox="1"/>
           <p:nvPr>
             <p:ph type="title"/>
@@ -41395,7 +41317,7 @@
       </p:sp>
       <p:sp>
         <p:nvSpPr>
-          <p:cNvPr id="747" name="Google Shape;747;p82"/>
+          <p:cNvPr id="746" name="Google Shape;746;p82"/>
           <p:cNvSpPr txBox="1"/>
           <p:nvPr/>
         </p:nvSpPr>
@@ -41453,7 +41375,7 @@
       </p:sp>
       <p:pic>
         <p:nvPicPr>
-          <p:cNvPr id="748" name="Google Shape;748;p82"/>
+          <p:cNvPr id="747" name="Google Shape;747;p82"/>
           <p:cNvPicPr preferRelativeResize="0"/>
           <p:nvPr/>
         </p:nvPicPr>
@@ -41481,7 +41403,7 @@
       </p:pic>
       <p:sp>
         <p:nvSpPr>
-          <p:cNvPr id="749" name="Google Shape;749;p82"/>
+          <p:cNvPr id="748" name="Google Shape;748;p82"/>
           <p:cNvSpPr/>
           <p:nvPr/>
         </p:nvSpPr>
@@ -41535,7 +41457,7 @@
   <p:cSld>
     <p:spTree>
       <p:nvGrpSpPr>
-        <p:cNvPr id="753" name="Shape 753"/>
+        <p:cNvPr id="752" name="Shape 752"/>
         <p:cNvGrpSpPr/>
         <p:nvPr/>
       </p:nvGrpSpPr>
@@ -41549,7 +41471,7 @@
       </p:grpSpPr>
       <p:sp>
         <p:nvSpPr>
-          <p:cNvPr id="754" name="Google Shape;754;p83"/>
+          <p:cNvPr id="753" name="Google Shape;753;p83"/>
           <p:cNvSpPr txBox="1"/>
           <p:nvPr>
             <p:ph idx="4294967295" type="subTitle"/>
@@ -41593,7 +41515,7 @@
       </p:sp>
       <p:sp>
         <p:nvSpPr>
-          <p:cNvPr id="755" name="Google Shape;755;p83"/>
+          <p:cNvPr id="754" name="Google Shape;754;p83"/>
           <p:cNvSpPr txBox="1"/>
           <p:nvPr>
             <p:ph idx="1" type="body"/>
@@ -41715,7 +41637,7 @@
       </p:sp>
       <p:sp>
         <p:nvSpPr>
-          <p:cNvPr id="756" name="Google Shape;756;p83"/>
+          <p:cNvPr id="755" name="Google Shape;755;p83"/>
           <p:cNvSpPr txBox="1"/>
           <p:nvPr>
             <p:ph type="title"/>
@@ -41755,7 +41677,7 @@
       </p:sp>
       <p:pic>
         <p:nvPicPr>
-          <p:cNvPr id="757" name="Google Shape;757;p83"/>
+          <p:cNvPr id="756" name="Google Shape;756;p83"/>
           <p:cNvPicPr preferRelativeResize="0"/>
           <p:nvPr/>
         </p:nvPicPr>
@@ -41783,7 +41705,7 @@
       </p:pic>
       <p:sp>
         <p:nvSpPr>
-          <p:cNvPr id="758" name="Google Shape;758;p83"/>
+          <p:cNvPr id="757" name="Google Shape;757;p83"/>
           <p:cNvSpPr/>
           <p:nvPr/>
         </p:nvSpPr>
@@ -41826,7 +41748,7 @@
       </p:sp>
       <p:sp>
         <p:nvSpPr>
-          <p:cNvPr id="759" name="Google Shape;759;p83"/>
+          <p:cNvPr id="758" name="Google Shape;758;p83"/>
           <p:cNvSpPr txBox="1"/>
           <p:nvPr/>
         </p:nvSpPr>
@@ -41895,7 +41817,7 @@
   <p:cSld>
     <p:spTree>
       <p:nvGrpSpPr>
-        <p:cNvPr id="763" name="Shape 763"/>
+        <p:cNvPr id="762" name="Shape 762"/>
         <p:cNvGrpSpPr/>
         <p:nvPr/>
       </p:nvGrpSpPr>
@@ -41909,7 +41831,7 @@
       </p:grpSpPr>
       <p:sp>
         <p:nvSpPr>
-          <p:cNvPr id="764" name="Google Shape;764;p84"/>
+          <p:cNvPr id="763" name="Google Shape;763;p84"/>
           <p:cNvSpPr txBox="1"/>
           <p:nvPr>
             <p:ph idx="4294967295" type="subTitle"/>
@@ -41953,7 +41875,7 @@
       </p:sp>
       <p:sp>
         <p:nvSpPr>
-          <p:cNvPr id="765" name="Google Shape;765;p84"/>
+          <p:cNvPr id="764" name="Google Shape;764;p84"/>
           <p:cNvSpPr txBox="1"/>
           <p:nvPr>
             <p:ph idx="1" type="body"/>
@@ -42092,7 +42014,7 @@
       </p:sp>
       <p:sp>
         <p:nvSpPr>
-          <p:cNvPr id="766" name="Google Shape;766;p84"/>
+          <p:cNvPr id="765" name="Google Shape;765;p84"/>
           <p:cNvSpPr txBox="1"/>
           <p:nvPr>
             <p:ph type="title"/>
@@ -42132,7 +42054,7 @@
       </p:sp>
       <p:pic>
         <p:nvPicPr>
-          <p:cNvPr id="767" name="Google Shape;767;p84"/>
+          <p:cNvPr id="766" name="Google Shape;766;p84"/>
           <p:cNvPicPr preferRelativeResize="0"/>
           <p:nvPr/>
         </p:nvPicPr>
@@ -42160,7 +42082,7 @@
       </p:pic>
       <p:sp>
         <p:nvSpPr>
-          <p:cNvPr id="768" name="Google Shape;768;p84"/>
+          <p:cNvPr id="767" name="Google Shape;767;p84"/>
           <p:cNvSpPr/>
           <p:nvPr/>
         </p:nvSpPr>
@@ -42203,7 +42125,7 @@
       </p:sp>
       <p:sp>
         <p:nvSpPr>
-          <p:cNvPr id="769" name="Google Shape;769;p84"/>
+          <p:cNvPr id="768" name="Google Shape;768;p84"/>
           <p:cNvSpPr txBox="1"/>
           <p:nvPr/>
         </p:nvSpPr>
@@ -42261,13 +42183,13 @@
       </p:sp>
       <p:sp>
         <p:nvSpPr>
-          <p:cNvPr id="770" name="Google Shape;770;p84"/>
+          <p:cNvPr id="769" name="Google Shape;769;p84"/>
           <p:cNvSpPr/>
           <p:nvPr/>
         </p:nvSpPr>
         <p:spPr>
           <a:xfrm>
-            <a:off x="3179525" y="3490925"/>
+            <a:off x="3255725" y="3490925"/>
             <a:ext cx="550800" cy="192600"/>
           </a:xfrm>
           <a:prstGeom prst="rect">
@@ -42332,7 +42254,7 @@
   <p:cSld>
     <p:spTree>
       <p:nvGrpSpPr>
-        <p:cNvPr id="774" name="Shape 774"/>
+        <p:cNvPr id="773" name="Shape 773"/>
         <p:cNvGrpSpPr/>
         <p:nvPr/>
       </p:nvGrpSpPr>
@@ -42346,7 +42268,7 @@
       </p:grpSpPr>
       <p:sp>
         <p:nvSpPr>
-          <p:cNvPr id="775" name="Google Shape;775;p85"/>
+          <p:cNvPr id="774" name="Google Shape;774;p85"/>
           <p:cNvSpPr txBox="1"/>
           <p:nvPr>
             <p:ph idx="4294967295" type="subTitle"/>
@@ -42390,7 +42312,7 @@
       </p:sp>
       <p:sp>
         <p:nvSpPr>
-          <p:cNvPr id="776" name="Google Shape;776;p85"/>
+          <p:cNvPr id="775" name="Google Shape;775;p85"/>
           <p:cNvSpPr txBox="1"/>
           <p:nvPr>
             <p:ph idx="1" type="body"/>
@@ -42546,7 +42468,7 @@
       </p:sp>
       <p:sp>
         <p:nvSpPr>
-          <p:cNvPr id="777" name="Google Shape;777;p85"/>
+          <p:cNvPr id="776" name="Google Shape;776;p85"/>
           <p:cNvSpPr txBox="1"/>
           <p:nvPr>
             <p:ph type="title"/>
@@ -42586,7 +42508,7 @@
       </p:sp>
       <p:pic>
         <p:nvPicPr>
-          <p:cNvPr id="778" name="Google Shape;778;p85"/>
+          <p:cNvPr id="777" name="Google Shape;777;p85"/>
           <p:cNvPicPr preferRelativeResize="0"/>
           <p:nvPr/>
         </p:nvPicPr>
@@ -42614,7 +42536,7 @@
       </p:pic>
       <p:sp>
         <p:nvSpPr>
-          <p:cNvPr id="779" name="Google Shape;779;p85"/>
+          <p:cNvPr id="778" name="Google Shape;778;p85"/>
           <p:cNvSpPr/>
           <p:nvPr/>
         </p:nvSpPr>
@@ -42657,7 +42579,7 @@
       </p:sp>
       <p:sp>
         <p:nvSpPr>
-          <p:cNvPr id="780" name="Google Shape;780;p85"/>
+          <p:cNvPr id="779" name="Google Shape;779;p85"/>
           <p:cNvSpPr txBox="1"/>
           <p:nvPr/>
         </p:nvSpPr>
@@ -42715,13 +42637,13 @@
       </p:sp>
       <p:sp>
         <p:nvSpPr>
-          <p:cNvPr id="781" name="Google Shape;781;p85"/>
+          <p:cNvPr id="780" name="Google Shape;780;p85"/>
           <p:cNvSpPr/>
           <p:nvPr/>
         </p:nvSpPr>
         <p:spPr>
           <a:xfrm>
-            <a:off x="3179525" y="3490925"/>
+            <a:off x="3255725" y="3490925"/>
             <a:ext cx="550800" cy="192600"/>
           </a:xfrm>
           <a:prstGeom prst="rect">
@@ -42786,7 +42708,7 @@
   <p:cSld>
     <p:spTree>
       <p:nvGrpSpPr>
-        <p:cNvPr id="785" name="Shape 785"/>
+        <p:cNvPr id="784" name="Shape 784"/>
         <p:cNvGrpSpPr/>
         <p:nvPr/>
       </p:nvGrpSpPr>
@@ -42800,7 +42722,7 @@
       </p:grpSpPr>
       <p:sp>
         <p:nvSpPr>
-          <p:cNvPr id="786" name="Google Shape;786;p86"/>
+          <p:cNvPr id="785" name="Google Shape;785;p86"/>
           <p:cNvSpPr txBox="1"/>
           <p:nvPr>
             <p:ph idx="4294967295" type="subTitle"/>
@@ -42844,7 +42766,7 @@
       </p:sp>
       <p:sp>
         <p:nvSpPr>
-          <p:cNvPr id="787" name="Google Shape;787;p86"/>
+          <p:cNvPr id="786" name="Google Shape;786;p86"/>
           <p:cNvSpPr txBox="1"/>
           <p:nvPr>
             <p:ph idx="1" type="body"/>
@@ -43021,7 +42943,7 @@
       </p:sp>
       <p:sp>
         <p:nvSpPr>
-          <p:cNvPr id="788" name="Google Shape;788;p86"/>
+          <p:cNvPr id="787" name="Google Shape;787;p86"/>
           <p:cNvSpPr txBox="1"/>
           <p:nvPr>
             <p:ph type="title"/>
@@ -43061,7 +42983,7 @@
       </p:sp>
       <p:pic>
         <p:nvPicPr>
-          <p:cNvPr id="789" name="Google Shape;789;p86"/>
+          <p:cNvPr id="788" name="Google Shape;788;p86"/>
           <p:cNvPicPr preferRelativeResize="0"/>
           <p:nvPr/>
         </p:nvPicPr>
@@ -43089,7 +43011,7 @@
       </p:pic>
       <p:sp>
         <p:nvSpPr>
-          <p:cNvPr id="790" name="Google Shape;790;p86"/>
+          <p:cNvPr id="789" name="Google Shape;789;p86"/>
           <p:cNvSpPr/>
           <p:nvPr/>
         </p:nvSpPr>
@@ -43132,7 +43054,7 @@
       </p:sp>
       <p:sp>
         <p:nvSpPr>
-          <p:cNvPr id="791" name="Google Shape;791;p86"/>
+          <p:cNvPr id="790" name="Google Shape;790;p86"/>
           <p:cNvSpPr txBox="1"/>
           <p:nvPr/>
         </p:nvSpPr>
@@ -43190,13 +43112,13 @@
       </p:sp>
       <p:sp>
         <p:nvSpPr>
-          <p:cNvPr id="792" name="Google Shape;792;p86"/>
+          <p:cNvPr id="791" name="Google Shape;791;p86"/>
           <p:cNvSpPr/>
           <p:nvPr/>
         </p:nvSpPr>
         <p:spPr>
           <a:xfrm>
-            <a:off x="3179525" y="3490925"/>
+            <a:off x="3255725" y="3490925"/>
             <a:ext cx="550800" cy="192600"/>
           </a:xfrm>
           <a:prstGeom prst="rect">
@@ -43261,7 +43183,7 @@
   <p:cSld>
     <p:spTree>
       <p:nvGrpSpPr>
-        <p:cNvPr id="796" name="Shape 796"/>
+        <p:cNvPr id="795" name="Shape 795"/>
         <p:cNvGrpSpPr/>
         <p:nvPr/>
       </p:nvGrpSpPr>
@@ -43275,7 +43197,7 @@
       </p:grpSpPr>
       <p:sp>
         <p:nvSpPr>
-          <p:cNvPr id="797" name="Google Shape;797;p87"/>
+          <p:cNvPr id="796" name="Google Shape;796;p87"/>
           <p:cNvSpPr txBox="1"/>
           <p:nvPr>
             <p:ph idx="4294967295" type="subTitle"/>
@@ -43319,7 +43241,7 @@
       </p:sp>
       <p:sp>
         <p:nvSpPr>
-          <p:cNvPr id="798" name="Google Shape;798;p87"/>
+          <p:cNvPr id="797" name="Google Shape;797;p87"/>
           <p:cNvSpPr txBox="1"/>
           <p:nvPr>
             <p:ph idx="1" type="body"/>
@@ -43509,7 +43431,7 @@
       </p:sp>
       <p:sp>
         <p:nvSpPr>
-          <p:cNvPr id="799" name="Google Shape;799;p87"/>
+          <p:cNvPr id="798" name="Google Shape;798;p87"/>
           <p:cNvSpPr txBox="1"/>
           <p:nvPr>
             <p:ph type="title"/>
@@ -43549,7 +43471,7 @@
       </p:sp>
       <p:pic>
         <p:nvPicPr>
-          <p:cNvPr id="800" name="Google Shape;800;p87"/>
+          <p:cNvPr id="799" name="Google Shape;799;p87"/>
           <p:cNvPicPr preferRelativeResize="0"/>
           <p:nvPr/>
         </p:nvPicPr>
@@ -43577,7 +43499,7 @@
       </p:pic>
       <p:sp>
         <p:nvSpPr>
-          <p:cNvPr id="801" name="Google Shape;801;p87"/>
+          <p:cNvPr id="800" name="Google Shape;800;p87"/>
           <p:cNvSpPr/>
           <p:nvPr/>
         </p:nvSpPr>
@@ -43620,7 +43542,7 @@
       </p:sp>
       <p:sp>
         <p:nvSpPr>
-          <p:cNvPr id="802" name="Google Shape;802;p87"/>
+          <p:cNvPr id="801" name="Google Shape;801;p87"/>
           <p:cNvSpPr txBox="1"/>
           <p:nvPr/>
         </p:nvSpPr>
@@ -43678,13 +43600,13 @@
       </p:sp>
       <p:sp>
         <p:nvSpPr>
-          <p:cNvPr id="803" name="Google Shape;803;p87"/>
+          <p:cNvPr id="802" name="Google Shape;802;p87"/>
           <p:cNvSpPr/>
           <p:nvPr/>
         </p:nvSpPr>
         <p:spPr>
           <a:xfrm>
-            <a:off x="3179525" y="3490925"/>
+            <a:off x="3255725" y="3490925"/>
             <a:ext cx="550800" cy="192600"/>
           </a:xfrm>
           <a:prstGeom prst="rect">
@@ -43749,7 +43671,7 @@
   <p:cSld>
     <p:spTree>
       <p:nvGrpSpPr>
-        <p:cNvPr id="807" name="Shape 807"/>
+        <p:cNvPr id="806" name="Shape 806"/>
         <p:cNvGrpSpPr/>
         <p:nvPr/>
       </p:nvGrpSpPr>
@@ -43763,7 +43685,7 @@
       </p:grpSpPr>
       <p:sp>
         <p:nvSpPr>
-          <p:cNvPr id="808" name="Google Shape;808;p88"/>
+          <p:cNvPr id="807" name="Google Shape;807;p88"/>
           <p:cNvSpPr txBox="1"/>
           <p:nvPr>
             <p:ph idx="4294967295" type="subTitle"/>
@@ -43807,7 +43729,7 @@
       </p:sp>
       <p:sp>
         <p:nvSpPr>
-          <p:cNvPr id="809" name="Google Shape;809;p88"/>
+          <p:cNvPr id="808" name="Google Shape;808;p88"/>
           <p:cNvSpPr txBox="1"/>
           <p:nvPr>
             <p:ph idx="1" type="body"/>
@@ -44014,7 +43936,7 @@
       </p:sp>
       <p:sp>
         <p:nvSpPr>
-          <p:cNvPr id="810" name="Google Shape;810;p88"/>
+          <p:cNvPr id="809" name="Google Shape;809;p88"/>
           <p:cNvSpPr txBox="1"/>
           <p:nvPr>
             <p:ph type="title"/>
@@ -44054,7 +43976,7 @@
       </p:sp>
       <p:pic>
         <p:nvPicPr>
-          <p:cNvPr id="811" name="Google Shape;811;p88"/>
+          <p:cNvPr id="810" name="Google Shape;810;p88"/>
           <p:cNvPicPr preferRelativeResize="0"/>
           <p:nvPr/>
         </p:nvPicPr>
@@ -44082,7 +44004,7 @@
       </p:pic>
       <p:sp>
         <p:nvSpPr>
-          <p:cNvPr id="812" name="Google Shape;812;p88"/>
+          <p:cNvPr id="811" name="Google Shape;811;p88"/>
           <p:cNvSpPr/>
           <p:nvPr/>
         </p:nvSpPr>
@@ -44125,7 +44047,7 @@
       </p:sp>
       <p:sp>
         <p:nvSpPr>
-          <p:cNvPr id="813" name="Google Shape;813;p88"/>
+          <p:cNvPr id="812" name="Google Shape;812;p88"/>
           <p:cNvSpPr txBox="1"/>
           <p:nvPr/>
         </p:nvSpPr>
@@ -44183,13 +44105,13 @@
       </p:sp>
       <p:sp>
         <p:nvSpPr>
-          <p:cNvPr id="814" name="Google Shape;814;p88"/>
+          <p:cNvPr id="813" name="Google Shape;813;p88"/>
           <p:cNvSpPr/>
           <p:nvPr/>
         </p:nvSpPr>
         <p:spPr>
           <a:xfrm>
-            <a:off x="3179525" y="3490925"/>
+            <a:off x="3255725" y="3490925"/>
             <a:ext cx="550800" cy="192600"/>
           </a:xfrm>
           <a:prstGeom prst="rect">
@@ -44254,7 +44176,7 @@
   <p:cSld>
     <p:spTree>
       <p:nvGrpSpPr>
-        <p:cNvPr id="818" name="Shape 818"/>
+        <p:cNvPr id="817" name="Shape 817"/>
         <p:cNvGrpSpPr/>
         <p:nvPr/>
       </p:nvGrpSpPr>
@@ -44268,7 +44190,7 @@
       </p:grpSpPr>
       <p:sp>
         <p:nvSpPr>
-          <p:cNvPr id="819" name="Google Shape;819;p89"/>
+          <p:cNvPr id="818" name="Google Shape;818;p89"/>
           <p:cNvSpPr txBox="1"/>
           <p:nvPr>
             <p:ph idx="4294967295" type="subTitle"/>
@@ -44312,7 +44234,7 @@
       </p:sp>
       <p:sp>
         <p:nvSpPr>
-          <p:cNvPr id="820" name="Google Shape;820;p89"/>
+          <p:cNvPr id="819" name="Google Shape;819;p89"/>
           <p:cNvSpPr txBox="1"/>
           <p:nvPr>
             <p:ph idx="1" type="body"/>
@@ -44353,7 +44275,7 @@
       </p:sp>
       <p:sp>
         <p:nvSpPr>
-          <p:cNvPr id="821" name="Google Shape;821;p89"/>
+          <p:cNvPr id="820" name="Google Shape;820;p89"/>
           <p:cNvSpPr txBox="1"/>
           <p:nvPr>
             <p:ph type="title"/>
@@ -44404,7 +44326,7 @@
   <p:cSld>
     <p:spTree>
       <p:nvGrpSpPr>
-        <p:cNvPr id="825" name="Shape 825"/>
+        <p:cNvPr id="824" name="Shape 824"/>
         <p:cNvGrpSpPr/>
         <p:nvPr/>
       </p:nvGrpSpPr>
@@ -44418,7 +44340,7 @@
       </p:grpSpPr>
       <p:sp>
         <p:nvSpPr>
-          <p:cNvPr id="826" name="Google Shape;826;p90"/>
+          <p:cNvPr id="825" name="Google Shape;825;p90"/>
           <p:cNvSpPr txBox="1"/>
           <p:nvPr>
             <p:ph idx="4294967295" type="subTitle"/>
@@ -44462,7 +44384,7 @@
       </p:sp>
       <p:sp>
         <p:nvSpPr>
-          <p:cNvPr id="827" name="Google Shape;827;p90"/>
+          <p:cNvPr id="826" name="Google Shape;826;p90"/>
           <p:cNvSpPr txBox="1"/>
           <p:nvPr>
             <p:ph idx="1" type="body"/>
@@ -44520,7 +44442,7 @@
       </p:sp>
       <p:sp>
         <p:nvSpPr>
-          <p:cNvPr id="828" name="Google Shape;828;p90"/>
+          <p:cNvPr id="827" name="Google Shape;827;p90"/>
           <p:cNvSpPr txBox="1"/>
           <p:nvPr>
             <p:ph type="title"/>
@@ -44571,7 +44493,7 @@
   <p:cSld>
     <p:spTree>
       <p:nvGrpSpPr>
-        <p:cNvPr id="832" name="Shape 832"/>
+        <p:cNvPr id="831" name="Shape 831"/>
         <p:cNvGrpSpPr/>
         <p:nvPr/>
       </p:nvGrpSpPr>
@@ -44585,7 +44507,7 @@
       </p:grpSpPr>
       <p:sp>
         <p:nvSpPr>
-          <p:cNvPr id="833" name="Google Shape;833;p91"/>
+          <p:cNvPr id="832" name="Google Shape;832;p91"/>
           <p:cNvSpPr txBox="1"/>
           <p:nvPr>
             <p:ph idx="4294967295" type="subTitle"/>
@@ -44629,7 +44551,7 @@
       </p:sp>
       <p:sp>
         <p:nvSpPr>
-          <p:cNvPr id="834" name="Google Shape;834;p91"/>
+          <p:cNvPr id="833" name="Google Shape;833;p91"/>
           <p:cNvSpPr txBox="1"/>
           <p:nvPr>
             <p:ph idx="1" type="body"/>
@@ -44704,7 +44626,7 @@
       </p:sp>
       <p:sp>
         <p:nvSpPr>
-          <p:cNvPr id="835" name="Google Shape;835;p91"/>
+          <p:cNvPr id="834" name="Google Shape;834;p91"/>
           <p:cNvSpPr txBox="1"/>
           <p:nvPr>
             <p:ph type="title"/>
@@ -44904,7 +44826,7 @@
   <p:cSld>
     <p:spTree>
       <p:nvGrpSpPr>
-        <p:cNvPr id="839" name="Shape 839"/>
+        <p:cNvPr id="838" name="Shape 838"/>
         <p:cNvGrpSpPr/>
         <p:nvPr/>
       </p:nvGrpSpPr>
@@ -44918,7 +44840,7 @@
       </p:grpSpPr>
       <p:sp>
         <p:nvSpPr>
-          <p:cNvPr id="840" name="Google Shape;840;p92"/>
+          <p:cNvPr id="839" name="Google Shape;839;p92"/>
           <p:cNvSpPr txBox="1"/>
           <p:nvPr>
             <p:ph idx="4294967295" type="subTitle"/>
@@ -44962,7 +44884,7 @@
       </p:sp>
       <p:sp>
         <p:nvSpPr>
-          <p:cNvPr id="841" name="Google Shape;841;p92"/>
+          <p:cNvPr id="840" name="Google Shape;840;p92"/>
           <p:cNvSpPr txBox="1"/>
           <p:nvPr>
             <p:ph idx="1" type="body"/>
@@ -45054,7 +44976,7 @@
       </p:sp>
       <p:sp>
         <p:nvSpPr>
-          <p:cNvPr id="842" name="Google Shape;842;p92"/>
+          <p:cNvPr id="841" name="Google Shape;841;p92"/>
           <p:cNvSpPr txBox="1"/>
           <p:nvPr>
             <p:ph type="title"/>
@@ -45094,7 +45016,7 @@
       </p:sp>
       <p:pic>
         <p:nvPicPr>
-          <p:cNvPr id="843" name="Google Shape;843;p92"/>
+          <p:cNvPr id="842" name="Google Shape;842;p92"/>
           <p:cNvPicPr preferRelativeResize="0"/>
           <p:nvPr/>
         </p:nvPicPr>
@@ -45122,7 +45044,7 @@
       </p:pic>
       <p:pic>
         <p:nvPicPr>
-          <p:cNvPr id="844" name="Google Shape;844;p92"/>
+          <p:cNvPr id="843" name="Google Shape;843;p92"/>
           <p:cNvPicPr preferRelativeResize="0"/>
           <p:nvPr/>
         </p:nvPicPr>
@@ -45161,7 +45083,7 @@
   <p:cSld>
     <p:spTree>
       <p:nvGrpSpPr>
-        <p:cNvPr id="848" name="Shape 848"/>
+        <p:cNvPr id="847" name="Shape 847"/>
         <p:cNvGrpSpPr/>
         <p:nvPr/>
       </p:nvGrpSpPr>
@@ -45175,7 +45097,7 @@
       </p:grpSpPr>
       <p:sp>
         <p:nvSpPr>
-          <p:cNvPr id="849" name="Google Shape;849;p93"/>
+          <p:cNvPr id="848" name="Google Shape;848;p93"/>
           <p:cNvSpPr txBox="1"/>
           <p:nvPr>
             <p:ph idx="4294967295" type="subTitle"/>
@@ -45219,7 +45141,7 @@
       </p:sp>
       <p:sp>
         <p:nvSpPr>
-          <p:cNvPr id="850" name="Google Shape;850;p93"/>
+          <p:cNvPr id="849" name="Google Shape;849;p93"/>
           <p:cNvSpPr txBox="1"/>
           <p:nvPr>
             <p:ph idx="1" type="body"/>
@@ -45311,7 +45233,7 @@
       </p:sp>
       <p:sp>
         <p:nvSpPr>
-          <p:cNvPr id="851" name="Google Shape;851;p93"/>
+          <p:cNvPr id="850" name="Google Shape;850;p93"/>
           <p:cNvSpPr txBox="1"/>
           <p:nvPr>
             <p:ph type="title"/>
@@ -45351,7 +45273,7 @@
       </p:sp>
       <p:pic>
         <p:nvPicPr>
-          <p:cNvPr id="852" name="Google Shape;852;p93"/>
+          <p:cNvPr id="851" name="Google Shape;851;p93"/>
           <p:cNvPicPr preferRelativeResize="0"/>
           <p:nvPr/>
         </p:nvPicPr>
@@ -45379,7 +45301,7 @@
       </p:pic>
       <p:sp>
         <p:nvSpPr>
-          <p:cNvPr id="853" name="Google Shape;853;p93"/>
+          <p:cNvPr id="852" name="Google Shape;852;p93"/>
           <p:cNvSpPr/>
           <p:nvPr/>
         </p:nvSpPr>
@@ -45432,7 +45354,7 @@
       </p:sp>
       <p:sp>
         <p:nvSpPr>
-          <p:cNvPr id="854" name="Google Shape;854;p93"/>
+          <p:cNvPr id="853" name="Google Shape;853;p93"/>
           <p:cNvSpPr txBox="1"/>
           <p:nvPr/>
         </p:nvSpPr>
@@ -45490,7 +45412,7 @@
       </p:sp>
       <p:pic>
         <p:nvPicPr>
-          <p:cNvPr id="855" name="Google Shape;855;p93"/>
+          <p:cNvPr id="854" name="Google Shape;854;p93"/>
           <p:cNvPicPr preferRelativeResize="0"/>
           <p:nvPr/>
         </p:nvPicPr>
@@ -45529,7 +45451,7 @@
   <p:cSld>
     <p:spTree>
       <p:nvGrpSpPr>
-        <p:cNvPr id="859" name="Shape 859"/>
+        <p:cNvPr id="858" name="Shape 858"/>
         <p:cNvGrpSpPr/>
         <p:nvPr/>
       </p:nvGrpSpPr>
@@ -45543,7 +45465,7 @@
       </p:grpSpPr>
       <p:sp>
         <p:nvSpPr>
-          <p:cNvPr id="860" name="Google Shape;860;p94"/>
+          <p:cNvPr id="859" name="Google Shape;859;p94"/>
           <p:cNvSpPr txBox="1"/>
           <p:nvPr>
             <p:ph idx="4294967295" type="subTitle"/>
@@ -45587,7 +45509,7 @@
       </p:sp>
       <p:sp>
         <p:nvSpPr>
-          <p:cNvPr id="861" name="Google Shape;861;p94"/>
+          <p:cNvPr id="860" name="Google Shape;860;p94"/>
           <p:cNvSpPr txBox="1"/>
           <p:nvPr>
             <p:ph idx="1" type="body"/>
@@ -45628,7 +45550,7 @@
       </p:sp>
       <p:sp>
         <p:nvSpPr>
-          <p:cNvPr id="862" name="Google Shape;862;p94"/>
+          <p:cNvPr id="861" name="Google Shape;861;p94"/>
           <p:cNvSpPr txBox="1"/>
           <p:nvPr>
             <p:ph type="title"/>
@@ -45679,7 +45601,7 @@
   <p:cSld>
     <p:spTree>
       <p:nvGrpSpPr>
-        <p:cNvPr id="866" name="Shape 866"/>
+        <p:cNvPr id="865" name="Shape 865"/>
         <p:cNvGrpSpPr/>
         <p:nvPr/>
       </p:nvGrpSpPr>
@@ -45693,7 +45615,7 @@
       </p:grpSpPr>
       <p:sp>
         <p:nvSpPr>
-          <p:cNvPr id="867" name="Google Shape;867;p95"/>
+          <p:cNvPr id="866" name="Google Shape;866;p95"/>
           <p:cNvSpPr txBox="1"/>
           <p:nvPr>
             <p:ph idx="4294967295" type="subTitle"/>
@@ -45737,7 +45659,7 @@
       </p:sp>
       <p:sp>
         <p:nvSpPr>
-          <p:cNvPr id="868" name="Google Shape;868;p95"/>
+          <p:cNvPr id="867" name="Google Shape;867;p95"/>
           <p:cNvSpPr txBox="1"/>
           <p:nvPr>
             <p:ph idx="1" type="body"/>
@@ -45795,7 +45717,7 @@
       </p:sp>
       <p:sp>
         <p:nvSpPr>
-          <p:cNvPr id="869" name="Google Shape;869;p95"/>
+          <p:cNvPr id="868" name="Google Shape;868;p95"/>
           <p:cNvSpPr txBox="1"/>
           <p:nvPr>
             <p:ph type="title"/>
@@ -45846,7 +45768,7 @@
   <p:cSld>
     <p:spTree>
       <p:nvGrpSpPr>
-        <p:cNvPr id="873" name="Shape 873"/>
+        <p:cNvPr id="872" name="Shape 872"/>
         <p:cNvGrpSpPr/>
         <p:nvPr/>
       </p:nvGrpSpPr>
@@ -45860,7 +45782,7 @@
       </p:grpSpPr>
       <p:sp>
         <p:nvSpPr>
-          <p:cNvPr id="874" name="Google Shape;874;p96"/>
+          <p:cNvPr id="873" name="Google Shape;873;p96"/>
           <p:cNvSpPr txBox="1"/>
           <p:nvPr>
             <p:ph idx="4294967295" type="subTitle"/>
@@ -45904,7 +45826,7 @@
       </p:sp>
       <p:sp>
         <p:nvSpPr>
-          <p:cNvPr id="875" name="Google Shape;875;p96"/>
+          <p:cNvPr id="874" name="Google Shape;874;p96"/>
           <p:cNvSpPr txBox="1"/>
           <p:nvPr>
             <p:ph idx="1" type="body"/>
@@ -45979,7 +45901,7 @@
       </p:sp>
       <p:sp>
         <p:nvSpPr>
-          <p:cNvPr id="876" name="Google Shape;876;p96"/>
+          <p:cNvPr id="875" name="Google Shape;875;p96"/>
           <p:cNvSpPr txBox="1"/>
           <p:nvPr>
             <p:ph type="title"/>
@@ -46030,7 +45952,7 @@
   <p:cSld>
     <p:spTree>
       <p:nvGrpSpPr>
-        <p:cNvPr id="880" name="Shape 880"/>
+        <p:cNvPr id="879" name="Shape 879"/>
         <p:cNvGrpSpPr/>
         <p:nvPr/>
       </p:nvGrpSpPr>
@@ -46044,7 +45966,7 @@
       </p:grpSpPr>
       <p:sp>
         <p:nvSpPr>
-          <p:cNvPr id="881" name="Google Shape;881;p97"/>
+          <p:cNvPr id="880" name="Google Shape;880;p97"/>
           <p:cNvSpPr txBox="1"/>
           <p:nvPr>
             <p:ph idx="4294967295" type="subTitle"/>
@@ -46088,7 +46010,7 @@
       </p:sp>
       <p:sp>
         <p:nvSpPr>
-          <p:cNvPr id="882" name="Google Shape;882;p97"/>
+          <p:cNvPr id="881" name="Google Shape;881;p97"/>
           <p:cNvSpPr txBox="1"/>
           <p:nvPr>
             <p:ph idx="1" type="body"/>
@@ -46180,7 +46102,7 @@
       </p:sp>
       <p:sp>
         <p:nvSpPr>
-          <p:cNvPr id="883" name="Google Shape;883;p97"/>
+          <p:cNvPr id="882" name="Google Shape;882;p97"/>
           <p:cNvSpPr txBox="1"/>
           <p:nvPr>
             <p:ph type="title"/>
@@ -46231,7 +46153,7 @@
   <p:cSld>
     <p:spTree>
       <p:nvGrpSpPr>
-        <p:cNvPr id="887" name="Shape 887"/>
+        <p:cNvPr id="886" name="Shape 886"/>
         <p:cNvGrpSpPr/>
         <p:nvPr/>
       </p:nvGrpSpPr>
@@ -46245,7 +46167,7 @@
       </p:grpSpPr>
       <p:sp>
         <p:nvSpPr>
-          <p:cNvPr id="888" name="Google Shape;888;p98"/>
+          <p:cNvPr id="887" name="Google Shape;887;p98"/>
           <p:cNvSpPr txBox="1"/>
           <p:nvPr>
             <p:ph type="title"/>
@@ -46285,7 +46207,7 @@
       </p:sp>
       <p:sp>
         <p:nvSpPr>
-          <p:cNvPr id="889" name="Google Shape;889;p98"/>
+          <p:cNvPr id="888" name="Google Shape;888;p98"/>
           <p:cNvSpPr txBox="1"/>
           <p:nvPr>
             <p:ph idx="4294967295" type="subTitle"/>
@@ -46487,6 +46409,285 @@
 </file>
 
 <file path=ppt/theme/theme1.xml><?xml version="1.0" encoding="utf-8"?>
+<a:theme xmlns:a="http://schemas.openxmlformats.org/drawingml/2006/main" xmlns:r="http://schemas.openxmlformats.org/officeDocument/2006/relationships" name="Focus">
+  <a:themeElements>
+    <a:clrScheme name="Focus">
+      <a:dk1>
+        <a:srgbClr val="1B212C"/>
+      </a:dk1>
+      <a:lt1>
+        <a:srgbClr val="FFFFFF"/>
+      </a:lt1>
+      <a:dk2>
+        <a:srgbClr val="D9D9D9"/>
+      </a:dk2>
+      <a:lt2>
+        <a:srgbClr val="82C7A5"/>
+      </a:lt2>
+      <a:accent1>
+        <a:srgbClr val="0145AC"/>
+      </a:accent1>
+      <a:accent2>
+        <a:srgbClr val="EECE1A"/>
+      </a:accent2>
+      <a:accent3>
+        <a:srgbClr val="4E5567"/>
+      </a:accent3>
+      <a:accent4>
+        <a:srgbClr val="F4D6AD"/>
+      </a:accent4>
+      <a:accent5>
+        <a:srgbClr val="7890CD"/>
+      </a:accent5>
+      <a:accent6>
+        <a:srgbClr val="F15E22"/>
+      </a:accent6>
+      <a:hlink>
+        <a:srgbClr val="7890CD"/>
+      </a:hlink>
+      <a:folHlink>
+        <a:srgbClr val="7890CD"/>
+      </a:folHlink>
+    </a:clrScheme>
+    <a:fontScheme name="Office">
+      <a:majorFont>
+        <a:latin typeface="Arial"/>
+        <a:ea typeface=""/>
+        <a:cs typeface=""/>
+        <a:font script="Jpan" typeface="ＭＳ Ｐゴシック"/>
+        <a:font script="Hang" typeface="맑은 고딕"/>
+        <a:font script="Hans" typeface="宋体"/>
+        <a:font script="Hant" typeface="新細明體"/>
+        <a:font script="Arab" typeface="Times New Roman"/>
+        <a:font script="Hebr" typeface="Times New Roman"/>
+        <a:font script="Thai" typeface="Angsana New"/>
+        <a:font script="Ethi" typeface="Nyala"/>
+        <a:font script="Beng" typeface="Vrinda"/>
+        <a:font script="Gujr" typeface="Shruti"/>
+        <a:font script="Khmr" typeface="MoolBoran"/>
+        <a:font script="Knda" typeface="Tunga"/>
+        <a:font script="Guru" typeface="Raavi"/>
+        <a:font script="Cans" typeface="Euphemia"/>
+        <a:font script="Cher" typeface="Plantagenet Cherokee"/>
+        <a:font script="Yiii" typeface="Microsoft Yi Baiti"/>
+        <a:font script="Tibt" typeface="Microsoft Himalaya"/>
+        <a:font script="Thaa" typeface="MV Boli"/>
+        <a:font script="Deva" typeface="Mangal"/>
+        <a:font script="Telu" typeface="Gautami"/>
+        <a:font script="Taml" typeface="Latha"/>
+        <a:font script="Syrc" typeface="Estrangelo Edessa"/>
+        <a:font script="Orya" typeface="Kalinga"/>
+        <a:font script="Mlym" typeface="Kartika"/>
+        <a:font script="Laoo" typeface="DokChampa"/>
+        <a:font script="Sinh" typeface="Iskoola Pota"/>
+        <a:font script="Mong" typeface="Mongolian Baiti"/>
+        <a:font script="Viet" typeface="Times New Roman"/>
+        <a:font script="Uigh" typeface="Microsoft Uighur"/>
+        <a:font script="Geor" typeface="Sylfaen"/>
+      </a:majorFont>
+      <a:minorFont>
+        <a:latin typeface="Arial"/>
+        <a:ea typeface=""/>
+        <a:cs typeface=""/>
+        <a:font script="Jpan" typeface="ＭＳ Ｐゴシック"/>
+        <a:font script="Hang" typeface="맑은 고딕"/>
+        <a:font script="Hans" typeface="宋体"/>
+        <a:font script="Hant" typeface="新細明體"/>
+        <a:font script="Arab" typeface="Arial"/>
+        <a:font script="Hebr" typeface="Arial"/>
+        <a:font script="Thai" typeface="Cordia New"/>
+        <a:font script="Ethi" typeface="Nyala"/>
+        <a:font script="Beng" typeface="Vrinda"/>
+        <a:font script="Gujr" typeface="Shruti"/>
+        <a:font script="Khmr" typeface="DaunPenh"/>
+        <a:font script="Knda" typeface="Tunga"/>
+        <a:font script="Guru" typeface="Raavi"/>
+        <a:font script="Cans" typeface="Euphemia"/>
+        <a:font script="Cher" typeface="Plantagenet Cherokee"/>
+        <a:font script="Yiii" typeface="Microsoft Yi Baiti"/>
+        <a:font script="Tibt" typeface="Microsoft Himalaya"/>
+        <a:font script="Thaa" typeface="MV Boli"/>
+        <a:font script="Deva" typeface="Mangal"/>
+        <a:font script="Telu" typeface="Gautami"/>
+        <a:font script="Taml" typeface="Latha"/>
+        <a:font script="Syrc" typeface="Estrangelo Edessa"/>
+        <a:font script="Orya" typeface="Kalinga"/>
+        <a:font script="Mlym" typeface="Kartika"/>
+        <a:font script="Laoo" typeface="DokChampa"/>
+        <a:font script="Sinh" typeface="Iskoola Pota"/>
+        <a:font script="Mong" typeface="Mongolian Baiti"/>
+        <a:font script="Viet" typeface="Arial"/>
+        <a:font script="Uigh" typeface="Microsoft Uighur"/>
+        <a:font script="Geor" typeface="Sylfaen"/>
+      </a:minorFont>
+    </a:fontScheme>
+    <a:fmtScheme name="Office">
+      <a:fillStyleLst>
+        <a:solidFill>
+          <a:schemeClr val="phClr"/>
+        </a:solidFill>
+        <a:gradFill rotWithShape="1">
+          <a:gsLst>
+            <a:gs pos="0">
+              <a:schemeClr val="phClr">
+                <a:tint val="50000"/>
+                <a:satMod val="300000"/>
+              </a:schemeClr>
+            </a:gs>
+            <a:gs pos="35000">
+              <a:schemeClr val="phClr">
+                <a:tint val="37000"/>
+                <a:satMod val="300000"/>
+              </a:schemeClr>
+            </a:gs>
+            <a:gs pos="100000">
+              <a:schemeClr val="phClr">
+                <a:tint val="15000"/>
+                <a:satMod val="350000"/>
+              </a:schemeClr>
+            </a:gs>
+          </a:gsLst>
+          <a:lin ang="16200000" scaled="1"/>
+        </a:gradFill>
+        <a:gradFill rotWithShape="1">
+          <a:gsLst>
+            <a:gs pos="0">
+              <a:schemeClr val="phClr">
+                <a:tint val="100000"/>
+                <a:shade val="100000"/>
+                <a:satMod val="130000"/>
+              </a:schemeClr>
+            </a:gs>
+            <a:gs pos="100000">
+              <a:schemeClr val="phClr">
+                <a:tint val="50000"/>
+                <a:shade val="100000"/>
+                <a:satMod val="350000"/>
+              </a:schemeClr>
+            </a:gs>
+          </a:gsLst>
+          <a:lin ang="16200000" scaled="0"/>
+        </a:gradFill>
+      </a:fillStyleLst>
+      <a:lnStyleLst>
+        <a:ln w="9525" cap="flat" cmpd="sng" algn="ctr">
+          <a:solidFill>
+            <a:schemeClr val="phClr">
+              <a:shade val="95000"/>
+              <a:satMod val="105000"/>
+            </a:schemeClr>
+          </a:solidFill>
+          <a:prstDash val="solid"/>
+        </a:ln>
+        <a:ln w="25400" cap="flat" cmpd="sng" algn="ctr">
+          <a:solidFill>
+            <a:schemeClr val="phClr"/>
+          </a:solidFill>
+          <a:prstDash val="solid"/>
+        </a:ln>
+        <a:ln w="38100" cap="flat" cmpd="sng" algn="ctr">
+          <a:solidFill>
+            <a:schemeClr val="phClr"/>
+          </a:solidFill>
+          <a:prstDash val="solid"/>
+        </a:ln>
+      </a:lnStyleLst>
+      <a:effectStyleLst>
+        <a:effectStyle>
+          <a:effectLst>
+            <a:outerShdw blurRad="40000" dist="20000" dir="5400000" rotWithShape="0">
+              <a:srgbClr val="000000">
+                <a:alpha val="38000"/>
+              </a:srgbClr>
+            </a:outerShdw>
+          </a:effectLst>
+        </a:effectStyle>
+        <a:effectStyle>
+          <a:effectLst>
+            <a:outerShdw blurRad="40000" dist="23000" dir="5400000" rotWithShape="0">
+              <a:srgbClr val="000000">
+                <a:alpha val="35000"/>
+              </a:srgbClr>
+            </a:outerShdw>
+          </a:effectLst>
+        </a:effectStyle>
+        <a:effectStyle>
+          <a:effectLst>
+            <a:outerShdw blurRad="40000" dist="23000" dir="5400000" rotWithShape="0">
+              <a:srgbClr val="000000">
+                <a:alpha val="35000"/>
+              </a:srgbClr>
+            </a:outerShdw>
+          </a:effectLst>
+          <a:scene3d>
+            <a:camera prst="orthographicFront">
+              <a:rot lat="0" lon="0" rev="0"/>
+            </a:camera>
+            <a:lightRig rig="threePt" dir="t">
+              <a:rot lat="0" lon="0" rev="1200000"/>
+            </a:lightRig>
+          </a:scene3d>
+          <a:sp3d>
+            <a:bevelT w="63500" h="25400"/>
+          </a:sp3d>
+        </a:effectStyle>
+      </a:effectStyleLst>
+      <a:bgFillStyleLst>
+        <a:solidFill>
+          <a:schemeClr val="phClr"/>
+        </a:solidFill>
+        <a:gradFill rotWithShape="1">
+          <a:gsLst>
+            <a:gs pos="0">
+              <a:schemeClr val="phClr">
+                <a:tint val="40000"/>
+                <a:satMod val="350000"/>
+              </a:schemeClr>
+            </a:gs>
+            <a:gs pos="40000">
+              <a:schemeClr val="phClr">
+                <a:tint val="45000"/>
+                <a:shade val="99000"/>
+                <a:satMod val="350000"/>
+              </a:schemeClr>
+            </a:gs>
+            <a:gs pos="100000">
+              <a:schemeClr val="phClr">
+                <a:shade val="20000"/>
+                <a:satMod val="255000"/>
+              </a:schemeClr>
+            </a:gs>
+          </a:gsLst>
+          <a:path path="circle">
+            <a:fillToRect l="50000" t="-80000" r="50000" b="180000"/>
+          </a:path>
+        </a:gradFill>
+        <a:gradFill rotWithShape="1">
+          <a:gsLst>
+            <a:gs pos="0">
+              <a:schemeClr val="phClr">
+                <a:tint val="80000"/>
+                <a:satMod val="300000"/>
+              </a:schemeClr>
+            </a:gs>
+            <a:gs pos="100000">
+              <a:schemeClr val="phClr">
+                <a:shade val="30000"/>
+                <a:satMod val="200000"/>
+              </a:schemeClr>
+            </a:gs>
+          </a:gsLst>
+          <a:path path="circle">
+            <a:fillToRect l="50000" t="50000" r="50000" b="50000"/>
+          </a:path>
+        </a:gradFill>
+      </a:bgFillStyleLst>
+    </a:fmtScheme>
+  </a:themeElements>
+</a:theme>
+</file>
+
+<file path=ppt/theme/theme2.xml><?xml version="1.0" encoding="utf-8"?>
 <a:theme xmlns:a="http://schemas.openxmlformats.org/drawingml/2006/main" xmlns:r="http://schemas.openxmlformats.org/officeDocument/2006/relationships">
   <a:themeElements>
     <a:clrScheme name="Default">
@@ -46763,283 +46964,4 @@
     </a:fmtScheme>
   </a:themeElements>
 </a:theme>
-</file>
-
-<file path=ppt/theme/theme2.xml><?xml version="1.0" encoding="utf-8"?>
-<a:theme xmlns:a="http://schemas.openxmlformats.org/drawingml/2006/main" xmlns:r="http://schemas.openxmlformats.org/officeDocument/2006/relationships" name="Focus">
-  <a:themeElements>
-    <a:clrScheme name="Focus">
-      <a:dk1>
-        <a:srgbClr val="1B212C"/>
-      </a:dk1>
-      <a:lt1>
-        <a:srgbClr val="FFFFFF"/>
-      </a:lt1>
-      <a:dk2>
-        <a:srgbClr val="D9D9D9"/>
-      </a:dk2>
-      <a:lt2>
-        <a:srgbClr val="82C7A5"/>
-      </a:lt2>
-      <a:accent1>
-        <a:srgbClr val="0145AC"/>
-      </a:accent1>
-      <a:accent2>
-        <a:srgbClr val="EECE1A"/>
-      </a:accent2>
-      <a:accent3>
-        <a:srgbClr val="4E5567"/>
-      </a:accent3>
-      <a:accent4>
-        <a:srgbClr val="F4D6AD"/>
-      </a:accent4>
-      <a:accent5>
-        <a:srgbClr val="7890CD"/>
-      </a:accent5>
-      <a:accent6>
-        <a:srgbClr val="F15E22"/>
-      </a:accent6>
-      <a:hlink>
-        <a:srgbClr val="7890CD"/>
-      </a:hlink>
-      <a:folHlink>
-        <a:srgbClr val="7890CD"/>
-      </a:folHlink>
-    </a:clrScheme>
-    <a:fontScheme name="Office">
-      <a:majorFont>
-        <a:latin typeface="Arial"/>
-        <a:ea typeface=""/>
-        <a:cs typeface=""/>
-        <a:font script="Jpan" typeface="ＭＳ Ｐゴシック"/>
-        <a:font script="Hang" typeface="맑은 고딕"/>
-        <a:font script="Hans" typeface="宋体"/>
-        <a:font script="Hant" typeface="新細明體"/>
-        <a:font script="Arab" typeface="Times New Roman"/>
-        <a:font script="Hebr" typeface="Times New Roman"/>
-        <a:font script="Thai" typeface="Angsana New"/>
-        <a:font script="Ethi" typeface="Nyala"/>
-        <a:font script="Beng" typeface="Vrinda"/>
-        <a:font script="Gujr" typeface="Shruti"/>
-        <a:font script="Khmr" typeface="MoolBoran"/>
-        <a:font script="Knda" typeface="Tunga"/>
-        <a:font script="Guru" typeface="Raavi"/>
-        <a:font script="Cans" typeface="Euphemia"/>
-        <a:font script="Cher" typeface="Plantagenet Cherokee"/>
-        <a:font script="Yiii" typeface="Microsoft Yi Baiti"/>
-        <a:font script="Tibt" typeface="Microsoft Himalaya"/>
-        <a:font script="Thaa" typeface="MV Boli"/>
-        <a:font script="Deva" typeface="Mangal"/>
-        <a:font script="Telu" typeface="Gautami"/>
-        <a:font script="Taml" typeface="Latha"/>
-        <a:font script="Syrc" typeface="Estrangelo Edessa"/>
-        <a:font script="Orya" typeface="Kalinga"/>
-        <a:font script="Mlym" typeface="Kartika"/>
-        <a:font script="Laoo" typeface="DokChampa"/>
-        <a:font script="Sinh" typeface="Iskoola Pota"/>
-        <a:font script="Mong" typeface="Mongolian Baiti"/>
-        <a:font script="Viet" typeface="Times New Roman"/>
-        <a:font script="Uigh" typeface="Microsoft Uighur"/>
-        <a:font script="Geor" typeface="Sylfaen"/>
-      </a:majorFont>
-      <a:minorFont>
-        <a:latin typeface="Arial"/>
-        <a:ea typeface=""/>
-        <a:cs typeface=""/>
-        <a:font script="Jpan" typeface="ＭＳ Ｐゴシック"/>
-        <a:font script="Hang" typeface="맑은 고딕"/>
-        <a:font script="Hans" typeface="宋体"/>
-        <a:font script="Hant" typeface="新細明體"/>
-        <a:font script="Arab" typeface="Arial"/>
-        <a:font script="Hebr" typeface="Arial"/>
-        <a:font script="Thai" typeface="Cordia New"/>
-        <a:font script="Ethi" typeface="Nyala"/>
-        <a:font script="Beng" typeface="Vrinda"/>
-        <a:font script="Gujr" typeface="Shruti"/>
-        <a:font script="Khmr" typeface="DaunPenh"/>
-        <a:font script="Knda" typeface="Tunga"/>
-        <a:font script="Guru" typeface="Raavi"/>
-        <a:font script="Cans" typeface="Euphemia"/>
-        <a:font script="Cher" typeface="Plantagenet Cherokee"/>
-        <a:font script="Yiii" typeface="Microsoft Yi Baiti"/>
-        <a:font script="Tibt" typeface="Microsoft Himalaya"/>
-        <a:font script="Thaa" typeface="MV Boli"/>
-        <a:font script="Deva" typeface="Mangal"/>
-        <a:font script="Telu" typeface="Gautami"/>
-        <a:font script="Taml" typeface="Latha"/>
-        <a:font script="Syrc" typeface="Estrangelo Edessa"/>
-        <a:font script="Orya" typeface="Kalinga"/>
-        <a:font script="Mlym" typeface="Kartika"/>
-        <a:font script="Laoo" typeface="DokChampa"/>
-        <a:font script="Sinh" typeface="Iskoola Pota"/>
-        <a:font script="Mong" typeface="Mongolian Baiti"/>
-        <a:font script="Viet" typeface="Arial"/>
-        <a:font script="Uigh" typeface="Microsoft Uighur"/>
-        <a:font script="Geor" typeface="Sylfaen"/>
-      </a:minorFont>
-    </a:fontScheme>
-    <a:fmtScheme name="Office">
-      <a:fillStyleLst>
-        <a:solidFill>
-          <a:schemeClr val="phClr"/>
-        </a:solidFill>
-        <a:gradFill rotWithShape="1">
-          <a:gsLst>
-            <a:gs pos="0">
-              <a:schemeClr val="phClr">
-                <a:tint val="50000"/>
-                <a:satMod val="300000"/>
-              </a:schemeClr>
-            </a:gs>
-            <a:gs pos="35000">
-              <a:schemeClr val="phClr">
-                <a:tint val="37000"/>
-                <a:satMod val="300000"/>
-              </a:schemeClr>
-            </a:gs>
-            <a:gs pos="100000">
-              <a:schemeClr val="phClr">
-                <a:tint val="15000"/>
-                <a:satMod val="350000"/>
-              </a:schemeClr>
-            </a:gs>
-          </a:gsLst>
-          <a:lin ang="16200000" scaled="1"/>
-        </a:gradFill>
-        <a:gradFill rotWithShape="1">
-          <a:gsLst>
-            <a:gs pos="0">
-              <a:schemeClr val="phClr">
-                <a:tint val="100000"/>
-                <a:shade val="100000"/>
-                <a:satMod val="130000"/>
-              </a:schemeClr>
-            </a:gs>
-            <a:gs pos="100000">
-              <a:schemeClr val="phClr">
-                <a:tint val="50000"/>
-                <a:shade val="100000"/>
-                <a:satMod val="350000"/>
-              </a:schemeClr>
-            </a:gs>
-          </a:gsLst>
-          <a:lin ang="16200000" scaled="0"/>
-        </a:gradFill>
-      </a:fillStyleLst>
-      <a:lnStyleLst>
-        <a:ln w="9525" cap="flat" cmpd="sng" algn="ctr">
-          <a:solidFill>
-            <a:schemeClr val="phClr">
-              <a:shade val="95000"/>
-              <a:satMod val="105000"/>
-            </a:schemeClr>
-          </a:solidFill>
-          <a:prstDash val="solid"/>
-        </a:ln>
-        <a:ln w="25400" cap="flat" cmpd="sng" algn="ctr">
-          <a:solidFill>
-            <a:schemeClr val="phClr"/>
-          </a:solidFill>
-          <a:prstDash val="solid"/>
-        </a:ln>
-        <a:ln w="38100" cap="flat" cmpd="sng" algn="ctr">
-          <a:solidFill>
-            <a:schemeClr val="phClr"/>
-          </a:solidFill>
-          <a:prstDash val="solid"/>
-        </a:ln>
-      </a:lnStyleLst>
-      <a:effectStyleLst>
-        <a:effectStyle>
-          <a:effectLst>
-            <a:outerShdw blurRad="40000" dist="20000" dir="5400000" rotWithShape="0">
-              <a:srgbClr val="000000">
-                <a:alpha val="38000"/>
-              </a:srgbClr>
-            </a:outerShdw>
-          </a:effectLst>
-        </a:effectStyle>
-        <a:effectStyle>
-          <a:effectLst>
-            <a:outerShdw blurRad="40000" dist="23000" dir="5400000" rotWithShape="0">
-              <a:srgbClr val="000000">
-                <a:alpha val="35000"/>
-              </a:srgbClr>
-            </a:outerShdw>
-          </a:effectLst>
-        </a:effectStyle>
-        <a:effectStyle>
-          <a:effectLst>
-            <a:outerShdw blurRad="40000" dist="23000" dir="5400000" rotWithShape="0">
-              <a:srgbClr val="000000">
-                <a:alpha val="35000"/>
-              </a:srgbClr>
-            </a:outerShdw>
-          </a:effectLst>
-          <a:scene3d>
-            <a:camera prst="orthographicFront">
-              <a:rot lat="0" lon="0" rev="0"/>
-            </a:camera>
-            <a:lightRig rig="threePt" dir="t">
-              <a:rot lat="0" lon="0" rev="1200000"/>
-            </a:lightRig>
-          </a:scene3d>
-          <a:sp3d>
-            <a:bevelT w="63500" h="25400"/>
-          </a:sp3d>
-        </a:effectStyle>
-      </a:effectStyleLst>
-      <a:bgFillStyleLst>
-        <a:solidFill>
-          <a:schemeClr val="phClr"/>
-        </a:solidFill>
-        <a:gradFill rotWithShape="1">
-          <a:gsLst>
-            <a:gs pos="0">
-              <a:schemeClr val="phClr">
-                <a:tint val="40000"/>
-                <a:satMod val="350000"/>
-              </a:schemeClr>
-            </a:gs>
-            <a:gs pos="40000">
-              <a:schemeClr val="phClr">
-                <a:tint val="45000"/>
-                <a:shade val="99000"/>
-                <a:satMod val="350000"/>
-              </a:schemeClr>
-            </a:gs>
-            <a:gs pos="100000">
-              <a:schemeClr val="phClr">
-                <a:shade val="20000"/>
-                <a:satMod val="255000"/>
-              </a:schemeClr>
-            </a:gs>
-          </a:gsLst>
-          <a:path path="circle">
-            <a:fillToRect l="50000" t="-80000" r="50000" b="180000"/>
-          </a:path>
-        </a:gradFill>
-        <a:gradFill rotWithShape="1">
-          <a:gsLst>
-            <a:gs pos="0">
-              <a:schemeClr val="phClr">
-                <a:tint val="80000"/>
-                <a:satMod val="300000"/>
-              </a:schemeClr>
-            </a:gs>
-            <a:gs pos="100000">
-              <a:schemeClr val="phClr">
-                <a:shade val="30000"/>
-                <a:satMod val="200000"/>
-              </a:schemeClr>
-            </a:gs>
-          </a:gsLst>
-          <a:path path="circle">
-            <a:fillToRect l="50000" t="50000" r="50000" b="50000"/>
-          </a:path>
-        </a:gradFill>
-      </a:bgFillStyleLst>
-    </a:fmtScheme>
-  </a:themeElements>
-</a:theme>
 </file>
</xml_diff>